<commit_message>
adjustments to show real-OS
ambiguity around Rd/Wr to UAlink MC 'traffic'
</commit_message>
<xml_diff>
--- a/Presentation/UALink deck.pptx
+++ b/Presentation/UALink deck.pptx
@@ -5,7 +5,7 @@
     <p:sldMasterId id="2147483648" r:id="rId1"/>
   </p:sldMasterIdLst>
   <p:notesMasterIdLst>
-    <p:notesMasterId r:id="rId34"/>
+    <p:notesMasterId r:id="rId37"/>
   </p:notesMasterIdLst>
   <p:sldIdLst>
     <p:sldId id="256" r:id="rId2"/>
@@ -40,6 +40,9 @@
     <p:sldId id="284" r:id="rId31"/>
     <p:sldId id="285" r:id="rId32"/>
     <p:sldId id="286" r:id="rId33"/>
+    <p:sldId id="288" r:id="rId34"/>
+    <p:sldId id="290" r:id="rId35"/>
+    <p:sldId id="291" r:id="rId36"/>
   </p:sldIdLst>
   <p:sldSz cx="9144000" cy="5143500" type="screen16x9"/>
   <p:notesSz cx="6858000" cy="9144000"/>
@@ -312,7 +315,11 @@
           </p14:sldIdLst>
         </p14:section>
         <p14:section name="Gem5/Qemu/LibFabric" id="{BB6B8D87-9033-E84E-9983-FF6F29BB54E3}">
-          <p14:sldIdLst/>
+          <p14:sldIdLst>
+            <p14:sldId id="288"/>
+            <p14:sldId id="290"/>
+            <p14:sldId id="291"/>
+          </p14:sldIdLst>
         </p14:section>
       </p14:sectionLst>
     </p:ext>
@@ -331,7 +338,7 @@
       </p15:sldGuideLst>
     </p:ext>
     <p:ext uri="GoogleSlidesCustomDataVersion2">
-      <go:slidesCustomData xmlns:go="http://customooxmlschemas.google.com/" xmlns:ahyp="http://schemas.microsoft.com/office/drawing/2018/hyperlinkcolor" xmlns:p15="http://schemas.microsoft.com/office/powerpoint/2012/main" xmlns:p14="http://schemas.microsoft.com/office/powerpoint/2010/main" xmlns:com="http://schemas.openxmlformats.org/drawingml/2006/compatibility" xmlns:pvml="urn:schemas-microsoft-com:office:powerpoint" xmlns:v="urn:schemas-microsoft-com:vml" xmlns:o="urn:schemas-microsoft-com:office:office" xmlns:dgm="http://schemas.openxmlformats.org/drawingml/2006/diagram" xmlns:c="http://schemas.openxmlformats.org/drawingml/2006/chart" xmlns:mv="urn:schemas-microsoft-com:mac:vml" xmlns:mc="http://schemas.openxmlformats.org/markup-compatibility/2006" xmlns="" r:id="rId38" roundtripDataSignature="AMtx7mjrny4whoIwxBF1efXB5M6HovKoRA=="/>
+      <go:slidesCustomData xmlns="" xmlns:mc="http://schemas.openxmlformats.org/markup-compatibility/2006" xmlns:mv="urn:schemas-microsoft-com:mac:vml" xmlns:c="http://schemas.openxmlformats.org/drawingml/2006/chart" xmlns:dgm="http://schemas.openxmlformats.org/drawingml/2006/diagram" xmlns:o="urn:schemas-microsoft-com:office:office" xmlns:v="urn:schemas-microsoft-com:vml" xmlns:pvml="urn:schemas-microsoft-com:office:powerpoint" xmlns:com="http://schemas.openxmlformats.org/drawingml/2006/compatibility" xmlns:p14="http://schemas.microsoft.com/office/powerpoint/2010/main" xmlns:p15="http://schemas.microsoft.com/office/powerpoint/2012/main" xmlns:ahyp="http://schemas.microsoft.com/office/drawing/2018/hyperlinkcolor" xmlns:go="http://customooxmlschemas.google.com/" r:id="rId38" roundtripDataSignature="AMtx7mjrny4whoIwxBF1efXB5M6HovKoRA=="/>
     </p:ext>
   </p:extLst>
 </p:presentation>
@@ -4317,6 +4324,240 @@
 </p:notes>
 </file>
 
+<file path=ppt/notesSlides/notesSlide32.xml><?xml version="1.0" encoding="utf-8"?>
+<p:notes xmlns:a="http://schemas.openxmlformats.org/drawingml/2006/main" xmlns:r="http://schemas.openxmlformats.org/officeDocument/2006/relationships" xmlns:p="http://schemas.openxmlformats.org/presentationml/2006/main" showMasterSp="0" showMasterPhAnim="0">
+  <p:cSld>
+    <p:spTree>
+      <p:nvGrpSpPr>
+        <p:cNvPr id="1" name="Shape 62">
+          <a:extLst>
+            <a:ext uri="{FF2B5EF4-FFF2-40B4-BE49-F238E27FC236}">
+              <a16:creationId xmlns:a16="http://schemas.microsoft.com/office/drawing/2014/main" id="{7EABD911-A504-3A34-1E90-0B8FC073DEA5}"/>
+            </a:ext>
+          </a:extLst>
+        </p:cNvPr>
+        <p:cNvGrpSpPr/>
+        <p:nvPr/>
+      </p:nvGrpSpPr>
+      <p:grpSpPr>
+        <a:xfrm>
+          <a:off x="0" y="0"/>
+          <a:ext cx="0" cy="0"/>
+          <a:chOff x="0" y="0"/>
+          <a:chExt cx="0" cy="0"/>
+        </a:xfrm>
+      </p:grpSpPr>
+      <p:sp>
+        <p:nvSpPr>
+          <p:cNvPr id="63" name="Google Shape;63;p3:notes">
+            <a:extLst>
+              <a:ext uri="{FF2B5EF4-FFF2-40B4-BE49-F238E27FC236}">
+                <a16:creationId xmlns:a16="http://schemas.microsoft.com/office/drawing/2014/main" id="{E08DD173-F0A1-1DFC-478E-FD51452FBD20}"/>
+              </a:ext>
+            </a:extLst>
+          </p:cNvPr>
+          <p:cNvSpPr>
+            <a:spLocks noGrp="1" noRot="1" noChangeAspect="1"/>
+          </p:cNvSpPr>
+          <p:nvPr>
+            <p:ph type="sldImg" idx="2"/>
+          </p:nvPr>
+        </p:nvSpPr>
+        <p:spPr>
+          <a:xfrm>
+            <a:off x="381000" y="685800"/>
+            <a:ext cx="6096000" cy="3429000"/>
+          </a:xfrm>
+          <a:custGeom>
+            <a:avLst/>
+            <a:gdLst/>
+            <a:ahLst/>
+            <a:cxnLst/>
+            <a:rect l="l" t="t" r="r" b="b"/>
+            <a:pathLst>
+              <a:path w="120000" h="120000" extrusionOk="0">
+                <a:moveTo>
+                  <a:pt x="0" y="0"/>
+                </a:moveTo>
+                <a:lnTo>
+                  <a:pt x="120000" y="0"/>
+                </a:lnTo>
+                <a:lnTo>
+                  <a:pt x="120000" y="120000"/>
+                </a:lnTo>
+                <a:lnTo>
+                  <a:pt x="0" y="120000"/>
+                </a:lnTo>
+                <a:close/>
+              </a:path>
+            </a:pathLst>
+          </a:custGeom>
+          <a:noFill/>
+          <a:ln w="9525" cap="flat" cmpd="sng">
+            <a:solidFill>
+              <a:srgbClr val="000000"/>
+            </a:solidFill>
+            <a:prstDash val="solid"/>
+            <a:round/>
+            <a:headEnd type="none" w="sm" len="sm"/>
+            <a:tailEnd type="none" w="sm" len="sm"/>
+          </a:ln>
+        </p:spPr>
+      </p:sp>
+      <p:sp>
+        <p:nvSpPr>
+          <p:cNvPr id="64" name="Google Shape;64;p3:notes">
+            <a:extLst>
+              <a:ext uri="{FF2B5EF4-FFF2-40B4-BE49-F238E27FC236}">
+                <a16:creationId xmlns:a16="http://schemas.microsoft.com/office/drawing/2014/main" id="{D085EB32-F11A-41FF-CD28-7EA7806E4A8D}"/>
+              </a:ext>
+            </a:extLst>
+          </p:cNvPr>
+          <p:cNvSpPr txBox="1">
+            <a:spLocks noGrp="1"/>
+          </p:cNvSpPr>
+          <p:nvPr>
+            <p:ph type="body" idx="1"/>
+          </p:nvPr>
+        </p:nvSpPr>
+        <p:spPr>
+          <a:xfrm>
+            <a:off x="685800" y="4343400"/>
+            <a:ext cx="5486400" cy="4114800"/>
+          </a:xfrm>
+          <a:prstGeom prst="rect">
+            <a:avLst/>
+          </a:prstGeom>
+          <a:noFill/>
+          <a:ln>
+            <a:noFill/>
+          </a:ln>
+        </p:spPr>
+        <p:txBody>
+          <a:bodyPr spcFirstLastPara="1" wrap="square" lIns="91425" tIns="91425" rIns="91425" bIns="91425" anchor="t" anchorCtr="0">
+            <a:noAutofit/>
+          </a:bodyPr>
+          <a:lstStyle/>
+          <a:p>
+            <a:pPr marL="0" lvl="0" indent="0" algn="l" rtl="0">
+              <a:lnSpc>
+                <a:spcPct val="100000"/>
+              </a:lnSpc>
+              <a:spcBef>
+                <a:spcPts val="0"/>
+              </a:spcBef>
+              <a:spcAft>
+                <a:spcPts val="0"/>
+              </a:spcAft>
+              <a:buSzPts val="1100"/>
+              <a:buNone/>
+            </a:pPr>
+            <a:endParaRPr/>
+          </a:p>
+        </p:txBody>
+      </p:sp>
+    </p:spTree>
+    <p:extLst>
+      <p:ext uri="{BB962C8B-B14F-4D97-AF65-F5344CB8AC3E}">
+        <p14:creationId xmlns:p14="http://schemas.microsoft.com/office/powerpoint/2010/main" val="3019874924"/>
+      </p:ext>
+    </p:extLst>
+  </p:cSld>
+  <p:clrMapOvr>
+    <a:masterClrMapping/>
+  </p:clrMapOvr>
+</p:notes>
+</file>
+
+<file path=ppt/notesSlides/notesSlide33.xml><?xml version="1.0" encoding="utf-8"?>
+<p:notes xmlns:a="http://schemas.openxmlformats.org/drawingml/2006/main" xmlns:r="http://schemas.openxmlformats.org/officeDocument/2006/relationships" xmlns:p="http://schemas.openxmlformats.org/presentationml/2006/main">
+  <p:cSld>
+    <p:spTree>
+      <p:nvGrpSpPr>
+        <p:cNvPr id="1" name=""/>
+        <p:cNvGrpSpPr/>
+        <p:nvPr/>
+      </p:nvGrpSpPr>
+      <p:grpSpPr>
+        <a:xfrm>
+          <a:off x="0" y="0"/>
+          <a:ext cx="0" cy="0"/>
+          <a:chOff x="0" y="0"/>
+          <a:chExt cx="0" cy="0"/>
+        </a:xfrm>
+      </p:grpSpPr>
+      <p:sp>
+        <p:nvSpPr>
+          <p:cNvPr id="2" name="Slide Image Placeholder 1"/>
+          <p:cNvSpPr>
+            <a:spLocks noGrp="1" noRot="1" noChangeAspect="1"/>
+          </p:cNvSpPr>
+          <p:nvPr>
+            <p:ph type="sldImg"/>
+          </p:nvPr>
+        </p:nvSpPr>
+        <p:spPr>
+          <a:xfrm>
+            <a:off x="381000" y="685800"/>
+            <a:ext cx="6096000" cy="3429000"/>
+          </a:xfrm>
+        </p:spPr>
+      </p:sp>
+      <p:sp>
+        <p:nvSpPr>
+          <p:cNvPr id="3" name="Notes Placeholder 2"/>
+          <p:cNvSpPr>
+            <a:spLocks noGrp="1"/>
+          </p:cNvSpPr>
+          <p:nvPr>
+            <p:ph type="body" idx="1"/>
+          </p:nvPr>
+        </p:nvSpPr>
+        <p:spPr/>
+        <p:txBody>
+          <a:bodyPr/>
+          <a:lstStyle/>
+          <a:p>
+            <a:endParaRPr lang="en-US" dirty="0"/>
+          </a:p>
+        </p:txBody>
+      </p:sp>
+      <p:sp>
+        <p:nvSpPr>
+          <p:cNvPr id="4" name="Slide Number Placeholder 3"/>
+          <p:cNvSpPr>
+            <a:spLocks noGrp="1"/>
+          </p:cNvSpPr>
+          <p:nvPr>
+            <p:ph type="sldNum" sz="quarter" idx="5"/>
+          </p:nvPr>
+        </p:nvSpPr>
+        <p:spPr/>
+        <p:txBody>
+          <a:bodyPr/>
+          <a:lstStyle/>
+          <a:p>
+            <a:fld id="{60725FA8-DB9E-4E4B-AAC3-6F89186F1CF9}" type="slidenum">
+              <a:rPr lang="en-US" smtClean="0"/>
+              <a:t>34</a:t>
+            </a:fld>
+            <a:endParaRPr lang="en-US"/>
+          </a:p>
+        </p:txBody>
+      </p:sp>
+    </p:spTree>
+    <p:extLst>
+      <p:ext uri="{BB962C8B-B14F-4D97-AF65-F5344CB8AC3E}">
+        <p14:creationId xmlns:p14="http://schemas.microsoft.com/office/powerpoint/2010/main" val="1222588325"/>
+      </p:ext>
+    </p:extLst>
+  </p:cSld>
+  <p:clrMapOvr>
+    <a:masterClrMapping/>
+  </p:clrMapOvr>
+</p:notes>
+</file>
+
 <file path=ppt/notesSlides/notesSlide4.xml><?xml version="1.0" encoding="utf-8"?>
 <p:notes xmlns:a="http://schemas.openxmlformats.org/drawingml/2006/main" xmlns:r="http://schemas.openxmlformats.org/officeDocument/2006/relationships" xmlns:p="http://schemas.openxmlformats.org/presentationml/2006/main" showMasterSp="0" showMasterPhAnim="0">
   <p:cSld>
@@ -6609,6 +6850,294 @@
 </p:sldLayout>
 </file>
 
+<file path=ppt/slideLayouts/slideLayout12.xml><?xml version="1.0" encoding="utf-8"?>
+<p:sldLayout xmlns:a="http://schemas.openxmlformats.org/drawingml/2006/main" xmlns:r="http://schemas.openxmlformats.org/officeDocument/2006/relationships" xmlns:p="http://schemas.openxmlformats.org/presentationml/2006/main" type="picTx">
+  <p:cSld name="Picture with Caption">
+    <p:spTree>
+      <p:nvGrpSpPr>
+        <p:cNvPr id="1" name=""/>
+        <p:cNvGrpSpPr/>
+        <p:nvPr/>
+      </p:nvGrpSpPr>
+      <p:grpSpPr>
+        <a:xfrm>
+          <a:off x="0" y="0"/>
+          <a:ext cx="0" cy="0"/>
+          <a:chOff x="0" y="0"/>
+          <a:chExt cx="0" cy="0"/>
+        </a:xfrm>
+      </p:grpSpPr>
+      <p:sp>
+        <p:nvSpPr>
+          <p:cNvPr id="2" name="Title 1">
+            <a:extLst>
+              <a:ext uri="{FF2B5EF4-FFF2-40B4-BE49-F238E27FC236}">
+                <a16:creationId xmlns:a16="http://schemas.microsoft.com/office/drawing/2014/main" id="{1E466731-0D3C-A5A7-BBD4-3FC73ACFC1C6}"/>
+              </a:ext>
+            </a:extLst>
+          </p:cNvPr>
+          <p:cNvSpPr>
+            <a:spLocks noGrp="1"/>
+          </p:cNvSpPr>
+          <p:nvPr>
+            <p:ph type="title"/>
+          </p:nvPr>
+        </p:nvSpPr>
+        <p:spPr>
+          <a:xfrm>
+            <a:off x="629841" y="342900"/>
+            <a:ext cx="2949178" cy="1200150"/>
+          </a:xfrm>
+        </p:spPr>
+        <p:txBody>
+          <a:bodyPr anchor="b"/>
+          <a:lstStyle>
+            <a:lvl1pPr>
+              <a:defRPr sz="2400"/>
+            </a:lvl1pPr>
+          </a:lstStyle>
+          <a:p>
+            <a:r>
+              <a:rPr lang="en-US"/>
+              <a:t>Click to edit Master title style</a:t>
+            </a:r>
+          </a:p>
+        </p:txBody>
+      </p:sp>
+      <p:sp>
+        <p:nvSpPr>
+          <p:cNvPr id="3" name="Picture Placeholder 2">
+            <a:extLst>
+              <a:ext uri="{FF2B5EF4-FFF2-40B4-BE49-F238E27FC236}">
+                <a16:creationId xmlns:a16="http://schemas.microsoft.com/office/drawing/2014/main" id="{2829234A-40B2-AD18-BE92-E4351152D994}"/>
+              </a:ext>
+            </a:extLst>
+          </p:cNvPr>
+          <p:cNvSpPr>
+            <a:spLocks noGrp="1"/>
+          </p:cNvSpPr>
+          <p:nvPr>
+            <p:ph type="pic" idx="1"/>
+          </p:nvPr>
+        </p:nvSpPr>
+        <p:spPr>
+          <a:xfrm>
+            <a:off x="3887391" y="740569"/>
+            <a:ext cx="4629150" cy="3655219"/>
+          </a:xfrm>
+        </p:spPr>
+        <p:txBody>
+          <a:bodyPr/>
+          <a:lstStyle>
+            <a:lvl1pPr marL="0" indent="0">
+              <a:buNone/>
+              <a:defRPr sz="2400"/>
+            </a:lvl1pPr>
+            <a:lvl2pPr marL="342900" indent="0">
+              <a:buNone/>
+              <a:defRPr sz="2100"/>
+            </a:lvl2pPr>
+            <a:lvl3pPr marL="685800" indent="0">
+              <a:buNone/>
+              <a:defRPr sz="1800"/>
+            </a:lvl3pPr>
+            <a:lvl4pPr marL="1028700" indent="0">
+              <a:buNone/>
+              <a:defRPr sz="1500"/>
+            </a:lvl4pPr>
+            <a:lvl5pPr marL="1371600" indent="0">
+              <a:buNone/>
+              <a:defRPr sz="1500"/>
+            </a:lvl5pPr>
+            <a:lvl6pPr marL="1714500" indent="0">
+              <a:buNone/>
+              <a:defRPr sz="1500"/>
+            </a:lvl6pPr>
+            <a:lvl7pPr marL="2057400" indent="0">
+              <a:buNone/>
+              <a:defRPr sz="1500"/>
+            </a:lvl7pPr>
+            <a:lvl8pPr marL="2400300" indent="0">
+              <a:buNone/>
+              <a:defRPr sz="1500"/>
+            </a:lvl8pPr>
+            <a:lvl9pPr marL="2743200" indent="0">
+              <a:buNone/>
+              <a:defRPr sz="1500"/>
+            </a:lvl9pPr>
+          </a:lstStyle>
+          <a:p>
+            <a:endParaRPr lang="en-US"/>
+          </a:p>
+        </p:txBody>
+      </p:sp>
+      <p:sp>
+        <p:nvSpPr>
+          <p:cNvPr id="4" name="Text Placeholder 3">
+            <a:extLst>
+              <a:ext uri="{FF2B5EF4-FFF2-40B4-BE49-F238E27FC236}">
+                <a16:creationId xmlns:a16="http://schemas.microsoft.com/office/drawing/2014/main" id="{A763DEA8-915F-4EEA-2B39-AF76CA3D15B9}"/>
+              </a:ext>
+            </a:extLst>
+          </p:cNvPr>
+          <p:cNvSpPr>
+            <a:spLocks noGrp="1"/>
+          </p:cNvSpPr>
+          <p:nvPr>
+            <p:ph type="body" sz="half" idx="2"/>
+          </p:nvPr>
+        </p:nvSpPr>
+        <p:spPr>
+          <a:xfrm>
+            <a:off x="629841" y="1543050"/>
+            <a:ext cx="2949178" cy="2858691"/>
+          </a:xfrm>
+        </p:spPr>
+        <p:txBody>
+          <a:bodyPr/>
+          <a:lstStyle>
+            <a:lvl1pPr marL="0" indent="0">
+              <a:buNone/>
+              <a:defRPr sz="1200"/>
+            </a:lvl1pPr>
+            <a:lvl2pPr marL="342900" indent="0">
+              <a:buNone/>
+              <a:defRPr sz="1050"/>
+            </a:lvl2pPr>
+            <a:lvl3pPr marL="685800" indent="0">
+              <a:buNone/>
+              <a:defRPr sz="900"/>
+            </a:lvl3pPr>
+            <a:lvl4pPr marL="1028700" indent="0">
+              <a:buNone/>
+              <a:defRPr sz="750"/>
+            </a:lvl4pPr>
+            <a:lvl5pPr marL="1371600" indent="0">
+              <a:buNone/>
+              <a:defRPr sz="750"/>
+            </a:lvl5pPr>
+            <a:lvl6pPr marL="1714500" indent="0">
+              <a:buNone/>
+              <a:defRPr sz="750"/>
+            </a:lvl6pPr>
+            <a:lvl7pPr marL="2057400" indent="0">
+              <a:buNone/>
+              <a:defRPr sz="750"/>
+            </a:lvl7pPr>
+            <a:lvl8pPr marL="2400300" indent="0">
+              <a:buNone/>
+              <a:defRPr sz="750"/>
+            </a:lvl8pPr>
+            <a:lvl9pPr marL="2743200" indent="0">
+              <a:buNone/>
+              <a:defRPr sz="750"/>
+            </a:lvl9pPr>
+          </a:lstStyle>
+          <a:p>
+            <a:pPr lvl="0"/>
+            <a:r>
+              <a:rPr lang="en-US"/>
+              <a:t>Click to edit Master text styles</a:t>
+            </a:r>
+          </a:p>
+        </p:txBody>
+      </p:sp>
+      <p:sp>
+        <p:nvSpPr>
+          <p:cNvPr id="5" name="Date Placeholder 4">
+            <a:extLst>
+              <a:ext uri="{FF2B5EF4-FFF2-40B4-BE49-F238E27FC236}">
+                <a16:creationId xmlns:a16="http://schemas.microsoft.com/office/drawing/2014/main" id="{AC6EBC29-6E47-C254-4FC2-4DA5A0513AB9}"/>
+              </a:ext>
+            </a:extLst>
+          </p:cNvPr>
+          <p:cNvSpPr>
+            <a:spLocks noGrp="1"/>
+          </p:cNvSpPr>
+          <p:nvPr>
+            <p:ph type="dt" sz="half" idx="10"/>
+          </p:nvPr>
+        </p:nvSpPr>
+        <p:spPr/>
+        <p:txBody>
+          <a:bodyPr/>
+          <a:lstStyle/>
+          <a:p>
+            <a:fld id="{BEAAFD63-98B8-4A21-AC0B-6202FDD2335C}" type="datetimeFigureOut">
+              <a:rPr lang="en-US" smtClean="0"/>
+              <a:t>10/6/25</a:t>
+            </a:fld>
+            <a:endParaRPr lang="en-US"/>
+          </a:p>
+        </p:txBody>
+      </p:sp>
+      <p:sp>
+        <p:nvSpPr>
+          <p:cNvPr id="6" name="Footer Placeholder 5">
+            <a:extLst>
+              <a:ext uri="{FF2B5EF4-FFF2-40B4-BE49-F238E27FC236}">
+                <a16:creationId xmlns:a16="http://schemas.microsoft.com/office/drawing/2014/main" id="{9FC196A7-E47C-10B5-D094-29AFB09E1641}"/>
+              </a:ext>
+            </a:extLst>
+          </p:cNvPr>
+          <p:cNvSpPr>
+            <a:spLocks noGrp="1"/>
+          </p:cNvSpPr>
+          <p:nvPr>
+            <p:ph type="ftr" sz="quarter" idx="11"/>
+          </p:nvPr>
+        </p:nvSpPr>
+        <p:spPr/>
+        <p:txBody>
+          <a:bodyPr/>
+          <a:lstStyle/>
+          <a:p>
+            <a:endParaRPr lang="en-US"/>
+          </a:p>
+        </p:txBody>
+      </p:sp>
+      <p:sp>
+        <p:nvSpPr>
+          <p:cNvPr id="7" name="Slide Number Placeholder 6">
+            <a:extLst>
+              <a:ext uri="{FF2B5EF4-FFF2-40B4-BE49-F238E27FC236}">
+                <a16:creationId xmlns:a16="http://schemas.microsoft.com/office/drawing/2014/main" id="{D28E22A7-5609-D5B4-4778-EA2EA98D6FE7}"/>
+              </a:ext>
+            </a:extLst>
+          </p:cNvPr>
+          <p:cNvSpPr>
+            <a:spLocks noGrp="1"/>
+          </p:cNvSpPr>
+          <p:nvPr>
+            <p:ph type="sldNum" sz="quarter" idx="12"/>
+          </p:nvPr>
+        </p:nvSpPr>
+        <p:spPr/>
+        <p:txBody>
+          <a:bodyPr/>
+          <a:lstStyle/>
+          <a:p>
+            <a:fld id="{CBC7C889-4C7F-4126-BC36-D932DBC812D2}" type="slidenum">
+              <a:rPr lang="en-US" smtClean="0"/>
+              <a:t>‹#›</a:t>
+            </a:fld>
+            <a:endParaRPr lang="en-US"/>
+          </a:p>
+        </p:txBody>
+      </p:sp>
+    </p:spTree>
+    <p:extLst>
+      <p:ext uri="{BB962C8B-B14F-4D97-AF65-F5344CB8AC3E}">
+        <p14:creationId xmlns:p14="http://schemas.microsoft.com/office/powerpoint/2010/main" val="2600374654"/>
+      </p:ext>
+    </p:extLst>
+  </p:cSld>
+  <p:clrMapOvr>
+    <a:masterClrMapping/>
+  </p:clrMapOvr>
+</p:sldLayout>
+</file>
+
 <file path=ppt/slideLayouts/slideLayout2.xml><?xml version="1.0" encoding="utf-8"?>
 <p:sldLayout xmlns:a="http://schemas.openxmlformats.org/drawingml/2006/main" xmlns:r="http://schemas.openxmlformats.org/officeDocument/2006/relationships" xmlns:p="http://schemas.openxmlformats.org/presentationml/2006/main" matchingName="Title and body" type="tx">
   <p:cSld name="TITLE_AND_BODY">
@@ -12098,6 +12627,7 @@
     <p:sldLayoutId id="2147483657" r:id="rId9"/>
     <p:sldLayoutId id="2147483658" r:id="rId10"/>
     <p:sldLayoutId id="2147483659" r:id="rId11"/>
+    <p:sldLayoutId id="2147483660" r:id="rId12"/>
   </p:sldLayoutIdLst>
   <p:hf sldNum="0" hdr="0" ftr="0" dt="0"/>
   <p:txStyles>
@@ -29361,6 +29891,1419 @@
 </p:sld>
 </file>
 
+<file path=ppt/slides/slide33.xml><?xml version="1.0" encoding="utf-8"?>
+<p:sld xmlns:a="http://schemas.openxmlformats.org/drawingml/2006/main" xmlns:r="http://schemas.openxmlformats.org/officeDocument/2006/relationships" xmlns:p="http://schemas.openxmlformats.org/presentationml/2006/main">
+  <p:cSld>
+    <p:spTree>
+      <p:nvGrpSpPr>
+        <p:cNvPr id="1" name="Shape 65">
+          <a:extLst>
+            <a:ext uri="{FF2B5EF4-FFF2-40B4-BE49-F238E27FC236}">
+              <a16:creationId xmlns:a16="http://schemas.microsoft.com/office/drawing/2014/main" id="{B0AA5BC1-30D4-089E-A4DB-5FF50CB2F67C}"/>
+            </a:ext>
+          </a:extLst>
+        </p:cNvPr>
+        <p:cNvGrpSpPr/>
+        <p:nvPr/>
+      </p:nvGrpSpPr>
+      <p:grpSpPr>
+        <a:xfrm>
+          <a:off x="0" y="0"/>
+          <a:ext cx="0" cy="0"/>
+          <a:chOff x="0" y="0"/>
+          <a:chExt cx="0" cy="0"/>
+        </a:xfrm>
+      </p:grpSpPr>
+      <p:sp>
+        <p:nvSpPr>
+          <p:cNvPr id="66" name="Google Shape;66;p3">
+            <a:extLst>
+              <a:ext uri="{FF2B5EF4-FFF2-40B4-BE49-F238E27FC236}">
+                <a16:creationId xmlns:a16="http://schemas.microsoft.com/office/drawing/2014/main" id="{D33E19FA-4440-294A-FDDA-2BDAACEEBD95}"/>
+              </a:ext>
+            </a:extLst>
+          </p:cNvPr>
+          <p:cNvSpPr txBox="1">
+            <a:spLocks noGrp="1"/>
+          </p:cNvSpPr>
+          <p:nvPr>
+            <p:ph type="title"/>
+          </p:nvPr>
+        </p:nvSpPr>
+        <p:spPr>
+          <a:xfrm>
+            <a:off x="311700" y="445025"/>
+            <a:ext cx="8520600" cy="572700"/>
+          </a:xfrm>
+          <a:prstGeom prst="rect">
+            <a:avLst/>
+          </a:prstGeom>
+          <a:noFill/>
+          <a:ln>
+            <a:noFill/>
+          </a:ln>
+        </p:spPr>
+        <p:txBody>
+          <a:bodyPr spcFirstLastPara="1" wrap="square" lIns="91425" tIns="91425" rIns="91425" bIns="91425" anchor="t" anchorCtr="0">
+            <a:normAutofit fontScale="90000"/>
+          </a:bodyPr>
+          <a:lstStyle/>
+          <a:p>
+            <a:pPr marL="0" lvl="0" indent="0" algn="l" rtl="0">
+              <a:lnSpc>
+                <a:spcPct val="100000"/>
+              </a:lnSpc>
+              <a:spcBef>
+                <a:spcPts val="0"/>
+              </a:spcBef>
+              <a:spcAft>
+                <a:spcPts val="0"/>
+              </a:spcAft>
+              <a:buSzPct val="111111"/>
+              <a:buNone/>
+            </a:pPr>
+            <a:r>
+              <a:rPr lang="en-US" dirty="0"/>
+              <a:t>Memory response variation and cache coherency scope</a:t>
+            </a:r>
+            <a:endParaRPr dirty="0"/>
+          </a:p>
+        </p:txBody>
+      </p:sp>
+      <p:sp>
+        <p:nvSpPr>
+          <p:cNvPr id="67" name="Google Shape;67;p3">
+            <a:extLst>
+              <a:ext uri="{FF2B5EF4-FFF2-40B4-BE49-F238E27FC236}">
+                <a16:creationId xmlns:a16="http://schemas.microsoft.com/office/drawing/2014/main" id="{77CD6A6A-3604-82DB-278F-5D9E7D0B9B9A}"/>
+              </a:ext>
+            </a:extLst>
+          </p:cNvPr>
+          <p:cNvSpPr/>
+          <p:nvPr/>
+        </p:nvSpPr>
+        <p:spPr>
+          <a:xfrm>
+            <a:off x="1150625" y="1395375"/>
+            <a:ext cx="3564900" cy="3666600"/>
+          </a:xfrm>
+          <a:prstGeom prst="roundRect">
+            <a:avLst>
+              <a:gd name="adj" fmla="val 16667"/>
+            </a:avLst>
+          </a:prstGeom>
+          <a:solidFill>
+            <a:schemeClr val="lt2"/>
+          </a:solidFill>
+          <a:ln w="9525" cap="flat" cmpd="sng">
+            <a:solidFill>
+              <a:schemeClr val="dk2"/>
+            </a:solidFill>
+            <a:prstDash val="solid"/>
+            <a:round/>
+            <a:headEnd type="none" w="sm" len="sm"/>
+            <a:tailEnd type="none" w="sm" len="sm"/>
+          </a:ln>
+        </p:spPr>
+        <p:txBody>
+          <a:bodyPr spcFirstLastPara="1" wrap="square" lIns="91425" tIns="91425" rIns="91425" bIns="91425" anchor="ctr" anchorCtr="0">
+            <a:noAutofit/>
+          </a:bodyPr>
+          <a:lstStyle/>
+          <a:p>
+            <a:pPr marL="0" marR="0" lvl="0" indent="0" algn="ctr" rtl="0">
+              <a:lnSpc>
+                <a:spcPct val="100000"/>
+              </a:lnSpc>
+              <a:spcBef>
+                <a:spcPts val="0"/>
+              </a:spcBef>
+              <a:spcAft>
+                <a:spcPts val="0"/>
+              </a:spcAft>
+              <a:buClr>
+                <a:srgbClr val="000000"/>
+              </a:buClr>
+              <a:buSzPts val="1400"/>
+              <a:buFont typeface="Arial"/>
+              <a:buNone/>
+            </a:pPr>
+            <a:endParaRPr sz="1400" b="0" i="0" u="none" strike="noStrike" cap="none">
+              <a:solidFill>
+                <a:srgbClr val="000000"/>
+              </a:solidFill>
+              <a:latin typeface="Arial"/>
+              <a:ea typeface="Arial"/>
+              <a:cs typeface="Arial"/>
+              <a:sym typeface="Arial"/>
+            </a:endParaRPr>
+          </a:p>
+        </p:txBody>
+      </p:sp>
+      <p:sp>
+        <p:nvSpPr>
+          <p:cNvPr id="68" name="Google Shape;68;p3">
+            <a:extLst>
+              <a:ext uri="{FF2B5EF4-FFF2-40B4-BE49-F238E27FC236}">
+                <a16:creationId xmlns:a16="http://schemas.microsoft.com/office/drawing/2014/main" id="{46E1FE80-6487-517C-0B7A-44AF0C02D7F0}"/>
+              </a:ext>
+            </a:extLst>
+          </p:cNvPr>
+          <p:cNvSpPr/>
+          <p:nvPr/>
+        </p:nvSpPr>
+        <p:spPr>
+          <a:xfrm>
+            <a:off x="3897425" y="1811250"/>
+            <a:ext cx="1035600" cy="572700"/>
+          </a:xfrm>
+          <a:prstGeom prst="rect">
+            <a:avLst/>
+          </a:prstGeom>
+          <a:solidFill>
+            <a:schemeClr val="lt2"/>
+          </a:solidFill>
+          <a:ln w="9525" cap="flat" cmpd="sng">
+            <a:solidFill>
+              <a:schemeClr val="dk2"/>
+            </a:solidFill>
+            <a:prstDash val="solid"/>
+            <a:round/>
+            <a:headEnd type="none" w="sm" len="sm"/>
+            <a:tailEnd type="none" w="sm" len="sm"/>
+          </a:ln>
+        </p:spPr>
+        <p:txBody>
+          <a:bodyPr spcFirstLastPara="1" wrap="square" lIns="91425" tIns="91425" rIns="91425" bIns="91425" anchor="ctr" anchorCtr="0">
+            <a:noAutofit/>
+          </a:bodyPr>
+          <a:lstStyle/>
+          <a:p>
+            <a:pPr marL="0" marR="0" lvl="0" indent="0" algn="ctr" rtl="0">
+              <a:lnSpc>
+                <a:spcPct val="100000"/>
+              </a:lnSpc>
+              <a:spcBef>
+                <a:spcPts val="0"/>
+              </a:spcBef>
+              <a:spcAft>
+                <a:spcPts val="0"/>
+              </a:spcAft>
+              <a:buClr>
+                <a:srgbClr val="000000"/>
+              </a:buClr>
+              <a:buSzPts val="1400"/>
+              <a:buFont typeface="Arial"/>
+              <a:buNone/>
+            </a:pPr>
+            <a:r>
+              <a:rPr lang="en-US" sz="1400" b="0" i="0" u="none" strike="noStrike" cap="none">
+                <a:solidFill>
+                  <a:srgbClr val="000000"/>
+                </a:solidFill>
+                <a:latin typeface="Arial"/>
+                <a:ea typeface="Arial"/>
+                <a:cs typeface="Arial"/>
+                <a:sym typeface="Arial"/>
+              </a:rPr>
+              <a:t>MC DDR</a:t>
+            </a:r>
+            <a:endParaRPr sz="1400" b="0" i="0" u="none" strike="noStrike" cap="none">
+              <a:solidFill>
+                <a:srgbClr val="000000"/>
+              </a:solidFill>
+              <a:latin typeface="Arial"/>
+              <a:ea typeface="Arial"/>
+              <a:cs typeface="Arial"/>
+              <a:sym typeface="Arial"/>
+            </a:endParaRPr>
+          </a:p>
+        </p:txBody>
+      </p:sp>
+      <p:sp>
+        <p:nvSpPr>
+          <p:cNvPr id="69" name="Google Shape;69;p3">
+            <a:extLst>
+              <a:ext uri="{FF2B5EF4-FFF2-40B4-BE49-F238E27FC236}">
+                <a16:creationId xmlns:a16="http://schemas.microsoft.com/office/drawing/2014/main" id="{8CA6457A-3AFE-54BE-370C-65263EBFB577}"/>
+              </a:ext>
+            </a:extLst>
+          </p:cNvPr>
+          <p:cNvSpPr/>
+          <p:nvPr/>
+        </p:nvSpPr>
+        <p:spPr>
+          <a:xfrm>
+            <a:off x="3897425" y="2571750"/>
+            <a:ext cx="1035600" cy="572700"/>
+          </a:xfrm>
+          <a:prstGeom prst="rect">
+            <a:avLst/>
+          </a:prstGeom>
+          <a:solidFill>
+            <a:schemeClr val="lt2"/>
+          </a:solidFill>
+          <a:ln w="9525" cap="flat" cmpd="sng">
+            <a:solidFill>
+              <a:schemeClr val="dk2"/>
+            </a:solidFill>
+            <a:prstDash val="solid"/>
+            <a:round/>
+            <a:headEnd type="none" w="sm" len="sm"/>
+            <a:tailEnd type="none" w="sm" len="sm"/>
+          </a:ln>
+        </p:spPr>
+        <p:txBody>
+          <a:bodyPr spcFirstLastPara="1" wrap="square" lIns="91425" tIns="91425" rIns="91425" bIns="91425" anchor="ctr" anchorCtr="0">
+            <a:noAutofit/>
+          </a:bodyPr>
+          <a:lstStyle/>
+          <a:p>
+            <a:pPr marL="0" marR="0" lvl="0" indent="0" algn="ctr" rtl="0">
+              <a:lnSpc>
+                <a:spcPct val="100000"/>
+              </a:lnSpc>
+              <a:spcBef>
+                <a:spcPts val="0"/>
+              </a:spcBef>
+              <a:spcAft>
+                <a:spcPts val="0"/>
+              </a:spcAft>
+              <a:buClr>
+                <a:srgbClr val="000000"/>
+              </a:buClr>
+              <a:buSzPts val="1400"/>
+              <a:buFont typeface="Arial"/>
+              <a:buNone/>
+            </a:pPr>
+            <a:r>
+              <a:rPr lang="en-US" sz="1400" b="0" i="0" u="none" strike="noStrike" cap="none" dirty="0">
+                <a:solidFill>
+                  <a:srgbClr val="000000"/>
+                </a:solidFill>
+                <a:latin typeface="Arial"/>
+                <a:ea typeface="Arial"/>
+                <a:cs typeface="Arial"/>
+                <a:sym typeface="Arial"/>
+              </a:rPr>
+              <a:t>MC DDR</a:t>
+            </a:r>
+            <a:endParaRPr sz="1400" b="0" i="0" u="none" strike="noStrike" cap="none" dirty="0">
+              <a:solidFill>
+                <a:srgbClr val="000000"/>
+              </a:solidFill>
+              <a:latin typeface="Arial"/>
+              <a:ea typeface="Arial"/>
+              <a:cs typeface="Arial"/>
+              <a:sym typeface="Arial"/>
+            </a:endParaRPr>
+          </a:p>
+          <a:p>
+            <a:pPr marL="0" marR="0" lvl="0" indent="0" algn="ctr" rtl="0">
+              <a:lnSpc>
+                <a:spcPct val="100000"/>
+              </a:lnSpc>
+              <a:spcBef>
+                <a:spcPts val="0"/>
+              </a:spcBef>
+              <a:spcAft>
+                <a:spcPts val="0"/>
+              </a:spcAft>
+              <a:buClr>
+                <a:srgbClr val="000000"/>
+              </a:buClr>
+              <a:buSzPts val="1400"/>
+              <a:buFont typeface="Arial"/>
+              <a:buNone/>
+            </a:pPr>
+            <a:r>
+              <a:rPr lang="en-US" sz="1400" b="0" i="0" u="none" strike="noStrike" cap="none" dirty="0">
+                <a:solidFill>
+                  <a:srgbClr val="000000"/>
+                </a:solidFill>
+                <a:latin typeface="Arial"/>
+                <a:ea typeface="Arial"/>
+                <a:cs typeface="Arial"/>
+                <a:sym typeface="Arial"/>
+              </a:rPr>
+              <a:t>~40-500ns</a:t>
+            </a:r>
+            <a:endParaRPr sz="1400" b="0" i="0" u="none" strike="noStrike" cap="none" dirty="0">
+              <a:solidFill>
+                <a:srgbClr val="000000"/>
+              </a:solidFill>
+              <a:latin typeface="Arial"/>
+              <a:ea typeface="Arial"/>
+              <a:cs typeface="Arial"/>
+              <a:sym typeface="Arial"/>
+            </a:endParaRPr>
+          </a:p>
+        </p:txBody>
+      </p:sp>
+      <p:sp>
+        <p:nvSpPr>
+          <p:cNvPr id="70" name="Google Shape;70;p3">
+            <a:extLst>
+              <a:ext uri="{FF2B5EF4-FFF2-40B4-BE49-F238E27FC236}">
+                <a16:creationId xmlns:a16="http://schemas.microsoft.com/office/drawing/2014/main" id="{2D316FBC-0C04-1296-4FCC-DB3B9F76DA33}"/>
+              </a:ext>
+            </a:extLst>
+          </p:cNvPr>
+          <p:cNvSpPr/>
+          <p:nvPr/>
+        </p:nvSpPr>
+        <p:spPr>
+          <a:xfrm>
+            <a:off x="3897425" y="3657800"/>
+            <a:ext cx="1094700" cy="572700"/>
+          </a:xfrm>
+          <a:prstGeom prst="rect">
+            <a:avLst/>
+          </a:prstGeom>
+          <a:solidFill>
+            <a:schemeClr val="lt2"/>
+          </a:solidFill>
+          <a:ln w="9525" cap="flat" cmpd="sng">
+            <a:solidFill>
+              <a:schemeClr val="dk2"/>
+            </a:solidFill>
+            <a:prstDash val="solid"/>
+            <a:round/>
+            <a:headEnd type="none" w="sm" len="sm"/>
+            <a:tailEnd type="none" w="sm" len="sm"/>
+          </a:ln>
+        </p:spPr>
+        <p:txBody>
+          <a:bodyPr spcFirstLastPara="1" wrap="square" lIns="91425" tIns="91425" rIns="91425" bIns="91425" anchor="ctr" anchorCtr="0">
+            <a:noAutofit/>
+          </a:bodyPr>
+          <a:lstStyle/>
+          <a:p>
+            <a:pPr marL="0" marR="0" lvl="0" indent="0" algn="ctr" rtl="0">
+              <a:lnSpc>
+                <a:spcPct val="100000"/>
+              </a:lnSpc>
+              <a:spcBef>
+                <a:spcPts val="0"/>
+              </a:spcBef>
+              <a:spcAft>
+                <a:spcPts val="0"/>
+              </a:spcAft>
+              <a:buClr>
+                <a:srgbClr val="000000"/>
+              </a:buClr>
+              <a:buSzPts val="1400"/>
+              <a:buFont typeface="Arial"/>
+              <a:buNone/>
+            </a:pPr>
+            <a:r>
+              <a:rPr lang="en-US" sz="1400" b="0" i="0" u="none" strike="noStrike" cap="none">
+                <a:solidFill>
+                  <a:srgbClr val="000000"/>
+                </a:solidFill>
+                <a:latin typeface="Arial"/>
+                <a:ea typeface="Arial"/>
+                <a:cs typeface="Arial"/>
+                <a:sym typeface="Arial"/>
+              </a:rPr>
+              <a:t>MC UALink</a:t>
+            </a:r>
+            <a:endParaRPr sz="1400" b="0" i="0" u="none" strike="noStrike" cap="none">
+              <a:solidFill>
+                <a:srgbClr val="000000"/>
+              </a:solidFill>
+              <a:latin typeface="Arial"/>
+              <a:ea typeface="Arial"/>
+              <a:cs typeface="Arial"/>
+              <a:sym typeface="Arial"/>
+            </a:endParaRPr>
+          </a:p>
+          <a:p>
+            <a:pPr marL="0" marR="0" lvl="0" indent="0" algn="ctr" rtl="0">
+              <a:lnSpc>
+                <a:spcPct val="100000"/>
+              </a:lnSpc>
+              <a:spcBef>
+                <a:spcPts val="0"/>
+              </a:spcBef>
+              <a:spcAft>
+                <a:spcPts val="0"/>
+              </a:spcAft>
+              <a:buClr>
+                <a:srgbClr val="000000"/>
+              </a:buClr>
+              <a:buSzPts val="1400"/>
+              <a:buFont typeface="Arial"/>
+              <a:buNone/>
+            </a:pPr>
+            <a:r>
+              <a:rPr lang="en-US" sz="1400" b="0" i="0" u="none" strike="noStrike" cap="none">
+                <a:solidFill>
+                  <a:srgbClr val="000000"/>
+                </a:solidFill>
+                <a:latin typeface="Arial"/>
+                <a:ea typeface="Arial"/>
+                <a:cs typeface="Arial"/>
+                <a:sym typeface="Arial"/>
+              </a:rPr>
+              <a:t>~500ns</a:t>
+            </a:r>
+            <a:endParaRPr sz="1400" b="0" i="0" u="none" strike="noStrike" cap="none">
+              <a:solidFill>
+                <a:srgbClr val="000000"/>
+              </a:solidFill>
+              <a:latin typeface="Arial"/>
+              <a:ea typeface="Arial"/>
+              <a:cs typeface="Arial"/>
+              <a:sym typeface="Arial"/>
+            </a:endParaRPr>
+          </a:p>
+        </p:txBody>
+      </p:sp>
+      <p:sp>
+        <p:nvSpPr>
+          <p:cNvPr id="71" name="Google Shape;71;p3">
+            <a:extLst>
+              <a:ext uri="{FF2B5EF4-FFF2-40B4-BE49-F238E27FC236}">
+                <a16:creationId xmlns:a16="http://schemas.microsoft.com/office/drawing/2014/main" id="{235C3CF2-6D14-655F-B39E-CEBF227EAD54}"/>
+              </a:ext>
+            </a:extLst>
+          </p:cNvPr>
+          <p:cNvSpPr/>
+          <p:nvPr/>
+        </p:nvSpPr>
+        <p:spPr>
+          <a:xfrm>
+            <a:off x="1869156" y="1607550"/>
+            <a:ext cx="1895510" cy="1907475"/>
+          </a:xfrm>
+          <a:prstGeom prst="rect">
+            <a:avLst/>
+          </a:prstGeom>
+          <a:solidFill>
+            <a:schemeClr val="lt2"/>
+          </a:solidFill>
+          <a:ln w="9525" cap="flat" cmpd="sng">
+            <a:solidFill>
+              <a:schemeClr val="dk2"/>
+            </a:solidFill>
+            <a:prstDash val="solid"/>
+            <a:round/>
+            <a:headEnd type="none" w="sm" len="sm"/>
+            <a:tailEnd type="none" w="sm" len="sm"/>
+          </a:ln>
+        </p:spPr>
+        <p:txBody>
+          <a:bodyPr spcFirstLastPara="1" wrap="square" lIns="91425" tIns="91425" rIns="91425" bIns="91425" anchor="ctr" anchorCtr="0">
+            <a:noAutofit/>
+          </a:bodyPr>
+          <a:lstStyle/>
+          <a:p>
+            <a:pPr marL="0" marR="0" lvl="0" indent="0" algn="ctr" rtl="0">
+              <a:lnSpc>
+                <a:spcPct val="100000"/>
+              </a:lnSpc>
+              <a:spcBef>
+                <a:spcPts val="0"/>
+              </a:spcBef>
+              <a:spcAft>
+                <a:spcPts val="0"/>
+              </a:spcAft>
+              <a:buClr>
+                <a:srgbClr val="000000"/>
+              </a:buClr>
+              <a:buSzPts val="1400"/>
+              <a:buFont typeface="Arial"/>
+              <a:buNone/>
+            </a:pPr>
+            <a:r>
+              <a:rPr lang="en-US" sz="1400" b="0" i="0" u="none" strike="noStrike" cap="none" dirty="0">
+                <a:solidFill>
+                  <a:srgbClr val="000000"/>
+                </a:solidFill>
+                <a:latin typeface="Arial"/>
+                <a:ea typeface="Arial"/>
+                <a:cs typeface="Arial"/>
+                <a:sym typeface="Arial"/>
+              </a:rPr>
+              <a:t>CPU or GPU</a:t>
+            </a:r>
+          </a:p>
+          <a:p>
+            <a:pPr marL="0" marR="0" lvl="0" indent="0" algn="ctr" rtl="0">
+              <a:lnSpc>
+                <a:spcPct val="100000"/>
+              </a:lnSpc>
+              <a:spcBef>
+                <a:spcPts val="0"/>
+              </a:spcBef>
+              <a:spcAft>
+                <a:spcPts val="0"/>
+              </a:spcAft>
+              <a:buClr>
+                <a:srgbClr val="000000"/>
+              </a:buClr>
+              <a:buSzPts val="1400"/>
+              <a:buFont typeface="Arial"/>
+              <a:buNone/>
+            </a:pPr>
+            <a:r>
+              <a:rPr lang="en-US" dirty="0"/>
+              <a:t>Core mesh</a:t>
+            </a:r>
+          </a:p>
+          <a:p>
+            <a:pPr marL="0" marR="0" lvl="0" indent="0" algn="ctr" rtl="0">
+              <a:lnSpc>
+                <a:spcPct val="100000"/>
+              </a:lnSpc>
+              <a:spcBef>
+                <a:spcPts val="0"/>
+              </a:spcBef>
+              <a:spcAft>
+                <a:spcPts val="0"/>
+              </a:spcAft>
+              <a:buClr>
+                <a:srgbClr val="000000"/>
+              </a:buClr>
+              <a:buSzPts val="1400"/>
+              <a:buFont typeface="Arial"/>
+              <a:buNone/>
+            </a:pPr>
+            <a:r>
+              <a:rPr lang="en-US" dirty="0"/>
+              <a:t>Smallest granularity is 64B </a:t>
+            </a:r>
+            <a:r>
+              <a:rPr lang="en-US" dirty="0" err="1"/>
+              <a:t>cacheline</a:t>
+            </a:r>
+            <a:endParaRPr lang="en-US" dirty="0"/>
+          </a:p>
+        </p:txBody>
+      </p:sp>
+      <p:sp>
+        <p:nvSpPr>
+          <p:cNvPr id="72" name="Google Shape;72;p3">
+            <a:extLst>
+              <a:ext uri="{FF2B5EF4-FFF2-40B4-BE49-F238E27FC236}">
+                <a16:creationId xmlns:a16="http://schemas.microsoft.com/office/drawing/2014/main" id="{EB202575-F294-22EE-268C-5915962049F8}"/>
+              </a:ext>
+            </a:extLst>
+          </p:cNvPr>
+          <p:cNvSpPr/>
+          <p:nvPr/>
+        </p:nvSpPr>
+        <p:spPr>
+          <a:xfrm>
+            <a:off x="2666775" y="3576675"/>
+            <a:ext cx="1035600" cy="381900"/>
+          </a:xfrm>
+          <a:prstGeom prst="rightArrow">
+            <a:avLst>
+              <a:gd name="adj1" fmla="val 50000"/>
+              <a:gd name="adj2" fmla="val 50000"/>
+            </a:avLst>
+          </a:prstGeom>
+          <a:solidFill>
+            <a:srgbClr val="FF0000"/>
+          </a:solidFill>
+          <a:ln w="9525" cap="flat" cmpd="sng">
+            <a:solidFill>
+              <a:schemeClr val="dk2"/>
+            </a:solidFill>
+            <a:prstDash val="solid"/>
+            <a:round/>
+            <a:headEnd type="none" w="sm" len="sm"/>
+            <a:tailEnd type="none" w="sm" len="sm"/>
+          </a:ln>
+        </p:spPr>
+        <p:txBody>
+          <a:bodyPr spcFirstLastPara="1" wrap="square" lIns="91425" tIns="91425" rIns="91425" bIns="91425" anchor="ctr" anchorCtr="0">
+            <a:noAutofit/>
+          </a:bodyPr>
+          <a:lstStyle/>
+          <a:p>
+            <a:pPr marL="0" marR="0" lvl="0" indent="0" algn="ctr" rtl="0">
+              <a:lnSpc>
+                <a:spcPct val="100000"/>
+              </a:lnSpc>
+              <a:spcBef>
+                <a:spcPts val="0"/>
+              </a:spcBef>
+              <a:spcAft>
+                <a:spcPts val="0"/>
+              </a:spcAft>
+              <a:buClr>
+                <a:srgbClr val="000000"/>
+              </a:buClr>
+              <a:buSzPts val="1400"/>
+              <a:buFont typeface="Arial"/>
+              <a:buNone/>
+            </a:pPr>
+            <a:r>
+              <a:rPr lang="en-US" sz="1400" b="0" i="0" u="none" strike="noStrike" cap="none">
+                <a:solidFill>
+                  <a:srgbClr val="000000"/>
+                </a:solidFill>
+                <a:latin typeface="Arial"/>
+                <a:ea typeface="Arial"/>
+                <a:cs typeface="Arial"/>
+                <a:sym typeface="Arial"/>
+              </a:rPr>
+              <a:t>Low lat</a:t>
+            </a:r>
+            <a:endParaRPr sz="1400" b="0" i="0" u="none" strike="noStrike" cap="none">
+              <a:solidFill>
+                <a:srgbClr val="000000"/>
+              </a:solidFill>
+              <a:latin typeface="Arial"/>
+              <a:ea typeface="Arial"/>
+              <a:cs typeface="Arial"/>
+              <a:sym typeface="Arial"/>
+            </a:endParaRPr>
+          </a:p>
+        </p:txBody>
+      </p:sp>
+      <p:sp>
+        <p:nvSpPr>
+          <p:cNvPr id="73" name="Google Shape;73;p3">
+            <a:extLst>
+              <a:ext uri="{FF2B5EF4-FFF2-40B4-BE49-F238E27FC236}">
+                <a16:creationId xmlns:a16="http://schemas.microsoft.com/office/drawing/2014/main" id="{882C8CFF-79C8-212D-DE63-422F5CB54F0F}"/>
+              </a:ext>
+            </a:extLst>
+          </p:cNvPr>
+          <p:cNvSpPr/>
+          <p:nvPr/>
+        </p:nvSpPr>
+        <p:spPr>
+          <a:xfrm>
+            <a:off x="2624350" y="4009175"/>
+            <a:ext cx="1035600" cy="381900"/>
+          </a:xfrm>
+          <a:prstGeom prst="rightArrow">
+            <a:avLst>
+              <a:gd name="adj1" fmla="val 50000"/>
+              <a:gd name="adj2" fmla="val 50000"/>
+            </a:avLst>
+          </a:prstGeom>
+          <a:solidFill>
+            <a:schemeClr val="accent1">
+              <a:lumMod val="40000"/>
+              <a:lumOff val="60000"/>
+            </a:schemeClr>
+          </a:solidFill>
+          <a:ln w="9525" cap="flat" cmpd="sng">
+            <a:solidFill>
+              <a:schemeClr val="dk2"/>
+            </a:solidFill>
+            <a:prstDash val="solid"/>
+            <a:round/>
+            <a:headEnd type="none" w="sm" len="sm"/>
+            <a:tailEnd type="none" w="sm" len="sm"/>
+          </a:ln>
+        </p:spPr>
+        <p:txBody>
+          <a:bodyPr spcFirstLastPara="1" wrap="square" lIns="91425" tIns="91425" rIns="91425" bIns="91425" anchor="ctr" anchorCtr="0">
+            <a:noAutofit/>
+          </a:bodyPr>
+          <a:lstStyle/>
+          <a:p>
+            <a:pPr marL="0" marR="0" lvl="0" indent="0" algn="ctr" rtl="0">
+              <a:lnSpc>
+                <a:spcPct val="100000"/>
+              </a:lnSpc>
+              <a:spcBef>
+                <a:spcPts val="0"/>
+              </a:spcBef>
+              <a:spcAft>
+                <a:spcPts val="0"/>
+              </a:spcAft>
+              <a:buClr>
+                <a:srgbClr val="000000"/>
+              </a:buClr>
+              <a:buSzPts val="1400"/>
+              <a:buFont typeface="Arial"/>
+              <a:buNone/>
+            </a:pPr>
+            <a:r>
+              <a:rPr lang="en-US" sz="1400" b="0" i="0" u="none" strike="noStrike" cap="none" dirty="0">
+                <a:solidFill>
+                  <a:srgbClr val="000000"/>
+                </a:solidFill>
+                <a:latin typeface="Arial"/>
+                <a:ea typeface="Arial"/>
+                <a:cs typeface="Arial"/>
+                <a:sym typeface="Arial"/>
+              </a:rPr>
+              <a:t>High </a:t>
+            </a:r>
+            <a:r>
+              <a:rPr lang="en-US" sz="1400" b="0" i="0" u="none" strike="noStrike" cap="none" dirty="0" err="1">
+                <a:solidFill>
+                  <a:srgbClr val="000000"/>
+                </a:solidFill>
+                <a:latin typeface="Arial"/>
+                <a:ea typeface="Arial"/>
+                <a:cs typeface="Arial"/>
+                <a:sym typeface="Arial"/>
+              </a:rPr>
+              <a:t>lat</a:t>
+            </a:r>
+            <a:endParaRPr sz="1400" b="0" i="0" u="none" strike="noStrike" cap="none" dirty="0">
+              <a:solidFill>
+                <a:srgbClr val="000000"/>
+              </a:solidFill>
+              <a:latin typeface="Arial"/>
+              <a:ea typeface="Arial"/>
+              <a:cs typeface="Arial"/>
+              <a:sym typeface="Arial"/>
+            </a:endParaRPr>
+          </a:p>
+        </p:txBody>
+      </p:sp>
+      <p:sp>
+        <p:nvSpPr>
+          <p:cNvPr id="74" name="Google Shape;74;p3">
+            <a:extLst>
+              <a:ext uri="{FF2B5EF4-FFF2-40B4-BE49-F238E27FC236}">
+                <a16:creationId xmlns:a16="http://schemas.microsoft.com/office/drawing/2014/main" id="{EB9C24B5-4C52-5609-CB26-8F5414470E91}"/>
+              </a:ext>
+            </a:extLst>
+          </p:cNvPr>
+          <p:cNvSpPr/>
+          <p:nvPr/>
+        </p:nvSpPr>
+        <p:spPr>
+          <a:xfrm>
+            <a:off x="6525226" y="2032800"/>
+            <a:ext cx="2559295" cy="1077900"/>
+          </a:xfrm>
+          <a:prstGeom prst="rect">
+            <a:avLst/>
+          </a:prstGeom>
+          <a:solidFill>
+            <a:schemeClr val="lt2"/>
+          </a:solidFill>
+          <a:ln w="9525" cap="flat" cmpd="sng">
+            <a:solidFill>
+              <a:schemeClr val="dk2"/>
+            </a:solidFill>
+            <a:prstDash val="solid"/>
+            <a:round/>
+            <a:headEnd type="none" w="sm" len="sm"/>
+            <a:tailEnd type="none" w="sm" len="sm"/>
+          </a:ln>
+        </p:spPr>
+        <p:txBody>
+          <a:bodyPr spcFirstLastPara="1" wrap="square" lIns="91425" tIns="91425" rIns="91425" bIns="91425" anchor="ctr" anchorCtr="0">
+            <a:noAutofit/>
+          </a:bodyPr>
+          <a:lstStyle/>
+          <a:p>
+            <a:pPr marL="0" marR="0" lvl="0" indent="0" algn="ctr" rtl="0">
+              <a:lnSpc>
+                <a:spcPct val="100000"/>
+              </a:lnSpc>
+              <a:spcBef>
+                <a:spcPts val="0"/>
+              </a:spcBef>
+              <a:spcAft>
+                <a:spcPts val="0"/>
+              </a:spcAft>
+              <a:buClr>
+                <a:srgbClr val="000000"/>
+              </a:buClr>
+              <a:buSzPts val="1400"/>
+              <a:buFont typeface="Arial"/>
+              <a:buNone/>
+            </a:pPr>
+            <a:r>
+              <a:rPr lang="en-US" sz="1100" b="0" i="0" u="none" strike="noStrike" cap="none" dirty="0">
+                <a:solidFill>
+                  <a:srgbClr val="000000"/>
+                </a:solidFill>
+                <a:latin typeface="Arial"/>
+                <a:ea typeface="Arial"/>
+                <a:cs typeface="Arial"/>
+                <a:sym typeface="Arial"/>
+              </a:rPr>
+              <a:t>As DRAM </a:t>
+            </a:r>
+            <a:r>
+              <a:rPr lang="en-US" sz="1100" b="0" i="0" u="none" strike="noStrike" cap="none" dirty="0" err="1">
+                <a:solidFill>
+                  <a:srgbClr val="000000"/>
+                </a:solidFill>
+                <a:latin typeface="Arial"/>
+                <a:ea typeface="Arial"/>
+                <a:cs typeface="Arial"/>
+                <a:sym typeface="Arial"/>
+              </a:rPr>
+              <a:t>txns</a:t>
+            </a:r>
+            <a:r>
+              <a:rPr lang="en-US" sz="1100" b="0" i="0" u="none" strike="noStrike" cap="none" dirty="0">
+                <a:solidFill>
+                  <a:srgbClr val="000000"/>
+                </a:solidFill>
+                <a:latin typeface="Arial"/>
+                <a:ea typeface="Arial"/>
+                <a:cs typeface="Arial"/>
+                <a:sym typeface="Arial"/>
+              </a:rPr>
+              <a:t> increase, loaded latency due to queueing with up to 500ns across all memory accesses. This is bad for real-time OS workloads and cross-VM conflicts.</a:t>
+            </a:r>
+            <a:endParaRPr sz="1100" b="0" i="0" u="none" strike="noStrike" cap="none" dirty="0">
+              <a:solidFill>
+                <a:srgbClr val="000000"/>
+              </a:solidFill>
+              <a:latin typeface="Arial"/>
+              <a:ea typeface="Arial"/>
+              <a:cs typeface="Arial"/>
+              <a:sym typeface="Arial"/>
+            </a:endParaRPr>
+          </a:p>
+        </p:txBody>
+      </p:sp>
+      <p:sp>
+        <p:nvSpPr>
+          <p:cNvPr id="75" name="Google Shape;75;p3">
+            <a:extLst>
+              <a:ext uri="{FF2B5EF4-FFF2-40B4-BE49-F238E27FC236}">
+                <a16:creationId xmlns:a16="http://schemas.microsoft.com/office/drawing/2014/main" id="{31D31A6E-92DE-B8F8-50F8-C6EE2E2DC88C}"/>
+              </a:ext>
+            </a:extLst>
+          </p:cNvPr>
+          <p:cNvSpPr/>
+          <p:nvPr/>
+        </p:nvSpPr>
+        <p:spPr>
+          <a:xfrm>
+            <a:off x="6432629" y="3661175"/>
+            <a:ext cx="2559296" cy="1077900"/>
+          </a:xfrm>
+          <a:prstGeom prst="rect">
+            <a:avLst/>
+          </a:prstGeom>
+          <a:solidFill>
+            <a:schemeClr val="lt2"/>
+          </a:solidFill>
+          <a:ln w="9525" cap="flat" cmpd="sng">
+            <a:solidFill>
+              <a:schemeClr val="dk2"/>
+            </a:solidFill>
+            <a:prstDash val="solid"/>
+            <a:round/>
+            <a:headEnd type="none" w="sm" len="sm"/>
+            <a:tailEnd type="none" w="sm" len="sm"/>
+          </a:ln>
+        </p:spPr>
+        <p:txBody>
+          <a:bodyPr spcFirstLastPara="1" wrap="square" lIns="91425" tIns="91425" rIns="91425" bIns="91425" anchor="ctr" anchorCtr="0">
+            <a:noAutofit/>
+          </a:bodyPr>
+          <a:lstStyle/>
+          <a:p>
+            <a:pPr marL="0" marR="0" lvl="0" indent="0" algn="ctr" rtl="0">
+              <a:lnSpc>
+                <a:spcPct val="100000"/>
+              </a:lnSpc>
+              <a:spcBef>
+                <a:spcPts val="0"/>
+              </a:spcBef>
+              <a:spcAft>
+                <a:spcPts val="0"/>
+              </a:spcAft>
+              <a:buClr>
+                <a:srgbClr val="000000"/>
+              </a:buClr>
+              <a:buSzPts val="1400"/>
+              <a:buFont typeface="Arial"/>
+              <a:buNone/>
+            </a:pPr>
+            <a:r>
+              <a:rPr lang="en-US" sz="1400" b="0" i="0" u="none" strike="noStrike" cap="none">
+                <a:solidFill>
+                  <a:srgbClr val="000000"/>
+                </a:solidFill>
+                <a:latin typeface="Arial"/>
+                <a:ea typeface="Arial"/>
+                <a:cs typeface="Arial"/>
+                <a:sym typeface="Arial"/>
+              </a:rPr>
+              <a:t>Prioritized queues helps guarantee latency SLA and put lower priority access (i.e. speculative prefetch, at lower priority)</a:t>
+            </a:r>
+            <a:endParaRPr sz="1400" b="0" i="0" u="none" strike="noStrike" cap="none">
+              <a:solidFill>
+                <a:srgbClr val="000000"/>
+              </a:solidFill>
+              <a:latin typeface="Arial"/>
+              <a:ea typeface="Arial"/>
+              <a:cs typeface="Arial"/>
+              <a:sym typeface="Arial"/>
+            </a:endParaRPr>
+          </a:p>
+        </p:txBody>
+      </p:sp>
+      <p:sp>
+        <p:nvSpPr>
+          <p:cNvPr id="12" name="Google Shape;70;p3">
+            <a:extLst>
+              <a:ext uri="{FF2B5EF4-FFF2-40B4-BE49-F238E27FC236}">
+                <a16:creationId xmlns:a16="http://schemas.microsoft.com/office/drawing/2014/main" id="{D8156FC4-52CF-96E5-556F-7C5F7EFBB127}"/>
+              </a:ext>
+            </a:extLst>
+          </p:cNvPr>
+          <p:cNvSpPr/>
+          <p:nvPr/>
+        </p:nvSpPr>
+        <p:spPr>
+          <a:xfrm>
+            <a:off x="811807" y="2942325"/>
+            <a:ext cx="1094700" cy="572700"/>
+          </a:xfrm>
+          <a:prstGeom prst="rect">
+            <a:avLst/>
+          </a:prstGeom>
+          <a:solidFill>
+            <a:schemeClr val="lt2"/>
+          </a:solidFill>
+          <a:ln w="9525" cap="flat" cmpd="sng">
+            <a:solidFill>
+              <a:schemeClr val="dk2"/>
+            </a:solidFill>
+            <a:prstDash val="solid"/>
+            <a:round/>
+            <a:headEnd type="none" w="sm" len="sm"/>
+            <a:tailEnd type="none" w="sm" len="sm"/>
+          </a:ln>
+        </p:spPr>
+        <p:txBody>
+          <a:bodyPr spcFirstLastPara="1" wrap="square" lIns="91425" tIns="91425" rIns="91425" bIns="91425" anchor="ctr" anchorCtr="0">
+            <a:noAutofit/>
+          </a:bodyPr>
+          <a:lstStyle/>
+          <a:p>
+            <a:pPr marL="0" marR="0" lvl="0" indent="0" algn="ctr" rtl="0">
+              <a:lnSpc>
+                <a:spcPct val="100000"/>
+              </a:lnSpc>
+              <a:spcBef>
+                <a:spcPts val="0"/>
+              </a:spcBef>
+              <a:spcAft>
+                <a:spcPts val="0"/>
+              </a:spcAft>
+              <a:buClr>
+                <a:srgbClr val="000000"/>
+              </a:buClr>
+              <a:buSzPts val="1400"/>
+              <a:buFont typeface="Arial"/>
+              <a:buNone/>
+            </a:pPr>
+            <a:r>
+              <a:rPr lang="en-US" sz="1400" b="0" i="0" u="none" strike="noStrike" cap="none" dirty="0">
+                <a:solidFill>
+                  <a:srgbClr val="000000"/>
+                </a:solidFill>
+                <a:latin typeface="Arial"/>
+                <a:ea typeface="Arial"/>
+                <a:cs typeface="Arial"/>
+                <a:sym typeface="Arial"/>
+              </a:rPr>
+              <a:t>Other </a:t>
+            </a:r>
+            <a:r>
+              <a:rPr lang="en-US" sz="1400" b="0" i="0" u="none" strike="noStrike" cap="none" dirty="0" err="1">
+                <a:solidFill>
+                  <a:srgbClr val="000000"/>
+                </a:solidFill>
+                <a:latin typeface="Arial"/>
+                <a:ea typeface="Arial"/>
+                <a:cs typeface="Arial"/>
+                <a:sym typeface="Arial"/>
+              </a:rPr>
+              <a:t>Skt</a:t>
+            </a:r>
+            <a:r>
+              <a:rPr lang="en-US" dirty="0"/>
+              <a:t> IF</a:t>
+            </a:r>
+            <a:endParaRPr sz="1400" b="0" i="0" u="none" strike="noStrike" cap="none" dirty="0">
+              <a:solidFill>
+                <a:srgbClr val="000000"/>
+              </a:solidFill>
+              <a:latin typeface="Arial"/>
+              <a:ea typeface="Arial"/>
+              <a:cs typeface="Arial"/>
+              <a:sym typeface="Arial"/>
+            </a:endParaRPr>
+          </a:p>
+        </p:txBody>
+      </p:sp>
+      <p:sp>
+        <p:nvSpPr>
+          <p:cNvPr id="3" name="Arrow: Right 2">
+            <a:extLst>
+              <a:ext uri="{FF2B5EF4-FFF2-40B4-BE49-F238E27FC236}">
+                <a16:creationId xmlns:a16="http://schemas.microsoft.com/office/drawing/2014/main" id="{A1DF1FC0-501C-FF1D-265D-B64389EDB3D5}"/>
+              </a:ext>
+            </a:extLst>
+          </p:cNvPr>
+          <p:cNvSpPr/>
+          <p:nvPr/>
+        </p:nvSpPr>
+        <p:spPr>
+          <a:xfrm>
+            <a:off x="5036067" y="3767625"/>
+            <a:ext cx="766823" cy="312516"/>
+          </a:xfrm>
+          <a:prstGeom prst="rightArrow">
+            <a:avLst/>
+          </a:prstGeom>
+        </p:spPr>
+        <p:style>
+          <a:lnRef idx="2">
+            <a:schemeClr val="accent1">
+              <a:shade val="50000"/>
+            </a:schemeClr>
+          </a:lnRef>
+          <a:fillRef idx="1">
+            <a:schemeClr val="accent1"/>
+          </a:fillRef>
+          <a:effectRef idx="0">
+            <a:schemeClr val="accent1"/>
+          </a:effectRef>
+          <a:fontRef idx="minor">
+            <a:schemeClr val="lt1"/>
+          </a:fontRef>
+        </p:style>
+        <p:txBody>
+          <a:bodyPr rtlCol="0" anchor="ctr"/>
+          <a:lstStyle/>
+          <a:p>
+            <a:pPr algn="ctr"/>
+            <a:r>
+              <a:rPr lang="en-US" dirty="0" err="1"/>
+              <a:t>CLz</a:t>
+            </a:r>
+            <a:endParaRPr lang="en-US" dirty="0"/>
+          </a:p>
+        </p:txBody>
+      </p:sp>
+      <p:sp>
+        <p:nvSpPr>
+          <p:cNvPr id="15" name="Arrow: Right 14">
+            <a:extLst>
+              <a:ext uri="{FF2B5EF4-FFF2-40B4-BE49-F238E27FC236}">
+                <a16:creationId xmlns:a16="http://schemas.microsoft.com/office/drawing/2014/main" id="{28FF1200-5332-0778-5E8C-CAE0C69444B3}"/>
+              </a:ext>
+            </a:extLst>
+          </p:cNvPr>
+          <p:cNvSpPr/>
+          <p:nvPr/>
+        </p:nvSpPr>
+        <p:spPr>
+          <a:xfrm>
+            <a:off x="4961681" y="2756704"/>
+            <a:ext cx="825661" cy="312516"/>
+          </a:xfrm>
+          <a:prstGeom prst="rightArrow">
+            <a:avLst/>
+          </a:prstGeom>
+        </p:spPr>
+        <p:style>
+          <a:lnRef idx="2">
+            <a:schemeClr val="accent1">
+              <a:shade val="50000"/>
+            </a:schemeClr>
+          </a:lnRef>
+          <a:fillRef idx="1">
+            <a:schemeClr val="accent1"/>
+          </a:fillRef>
+          <a:effectRef idx="0">
+            <a:schemeClr val="accent1"/>
+          </a:effectRef>
+          <a:fontRef idx="minor">
+            <a:schemeClr val="lt1"/>
+          </a:fontRef>
+        </p:style>
+        <p:txBody>
+          <a:bodyPr rtlCol="0" anchor="ctr"/>
+          <a:lstStyle/>
+          <a:p>
+            <a:pPr algn="ctr"/>
+            <a:r>
+              <a:rPr lang="en-US" dirty="0" err="1"/>
+              <a:t>CLy</a:t>
+            </a:r>
+            <a:endParaRPr lang="en-US" dirty="0"/>
+          </a:p>
+        </p:txBody>
+      </p:sp>
+      <p:sp>
+        <p:nvSpPr>
+          <p:cNvPr id="16" name="Arrow: Right 15">
+            <a:extLst>
+              <a:ext uri="{FF2B5EF4-FFF2-40B4-BE49-F238E27FC236}">
+                <a16:creationId xmlns:a16="http://schemas.microsoft.com/office/drawing/2014/main" id="{5CBA9FEA-95C8-D293-A9C2-51DABB6D0709}"/>
+              </a:ext>
+            </a:extLst>
+          </p:cNvPr>
+          <p:cNvSpPr/>
+          <p:nvPr/>
+        </p:nvSpPr>
+        <p:spPr>
+          <a:xfrm>
+            <a:off x="5172919" y="2131671"/>
+            <a:ext cx="766823" cy="312516"/>
+          </a:xfrm>
+          <a:prstGeom prst="rightArrow">
+            <a:avLst/>
+          </a:prstGeom>
+        </p:spPr>
+        <p:style>
+          <a:lnRef idx="2">
+            <a:schemeClr val="accent1">
+              <a:shade val="50000"/>
+            </a:schemeClr>
+          </a:lnRef>
+          <a:fillRef idx="1">
+            <a:schemeClr val="accent1"/>
+          </a:fillRef>
+          <a:effectRef idx="0">
+            <a:schemeClr val="accent1"/>
+          </a:effectRef>
+          <a:fontRef idx="minor">
+            <a:schemeClr val="lt1"/>
+          </a:fontRef>
+        </p:style>
+        <p:txBody>
+          <a:bodyPr rtlCol="0" anchor="ctr"/>
+          <a:lstStyle/>
+          <a:p>
+            <a:pPr algn="ctr"/>
+            <a:r>
+              <a:rPr lang="en-US" dirty="0" err="1"/>
+              <a:t>CLx</a:t>
+            </a:r>
+            <a:endParaRPr lang="en-US" dirty="0"/>
+          </a:p>
+        </p:txBody>
+      </p:sp>
+      <p:sp>
+        <p:nvSpPr>
+          <p:cNvPr id="2" name="Donut 1">
+            <a:extLst>
+              <a:ext uri="{FF2B5EF4-FFF2-40B4-BE49-F238E27FC236}">
+                <a16:creationId xmlns:a16="http://schemas.microsoft.com/office/drawing/2014/main" id="{803ACEFD-F5AA-6BD0-91FD-5AFE3D476B83}"/>
+              </a:ext>
+            </a:extLst>
+          </p:cNvPr>
+          <p:cNvSpPr/>
+          <p:nvPr/>
+        </p:nvSpPr>
+        <p:spPr>
+          <a:xfrm>
+            <a:off x="3658932" y="3302830"/>
+            <a:ext cx="2143958" cy="1368957"/>
+          </a:xfrm>
+          <a:prstGeom prst="donut">
+            <a:avLst>
+              <a:gd name="adj" fmla="val 2102"/>
+            </a:avLst>
+          </a:prstGeom>
+        </p:spPr>
+        <p:style>
+          <a:lnRef idx="2">
+            <a:schemeClr val="accent1">
+              <a:shade val="15000"/>
+            </a:schemeClr>
+          </a:lnRef>
+          <a:fillRef idx="1">
+            <a:schemeClr val="accent1"/>
+          </a:fillRef>
+          <a:effectRef idx="0">
+            <a:schemeClr val="accent1"/>
+          </a:effectRef>
+          <a:fontRef idx="minor">
+            <a:schemeClr val="lt1"/>
+          </a:fontRef>
+        </p:style>
+        <p:txBody>
+          <a:bodyPr rtlCol="0" anchor="ctr"/>
+          <a:lstStyle/>
+          <a:p>
+            <a:pPr algn="ctr"/>
+            <a:endParaRPr lang="en-US">
+              <a:solidFill>
+                <a:schemeClr val="tx1"/>
+              </a:solidFill>
+            </a:endParaRPr>
+          </a:p>
+        </p:txBody>
+      </p:sp>
+    </p:spTree>
+    <p:extLst>
+      <p:ext uri="{BB962C8B-B14F-4D97-AF65-F5344CB8AC3E}">
+        <p14:creationId xmlns:p14="http://schemas.microsoft.com/office/powerpoint/2010/main" val="1894727780"/>
+      </p:ext>
+    </p:extLst>
+  </p:cSld>
+  <p:clrMapOvr>
+    <a:masterClrMapping/>
+  </p:clrMapOvr>
+</p:sld>
+</file>
+
+<file path=ppt/slides/slide34.xml><?xml version="1.0" encoding="utf-8"?>
+<p:sld xmlns:a="http://schemas.openxmlformats.org/drawingml/2006/main" xmlns:r="http://schemas.openxmlformats.org/officeDocument/2006/relationships" xmlns:p="http://schemas.openxmlformats.org/presentationml/2006/main">
+  <p:cSld>
+    <p:spTree>
+      <p:nvGrpSpPr>
+        <p:cNvPr id="1" name=""/>
+        <p:cNvGrpSpPr/>
+        <p:nvPr/>
+      </p:nvGrpSpPr>
+      <p:grpSpPr>
+        <a:xfrm>
+          <a:off x="0" y="0"/>
+          <a:ext cx="0" cy="0"/>
+          <a:chOff x="0" y="0"/>
+          <a:chExt cx="0" cy="0"/>
+        </a:xfrm>
+      </p:grpSpPr>
+      <p:pic>
+        <p:nvPicPr>
+          <p:cNvPr id="6" name="Picture 5">
+            <a:extLst>
+              <a:ext uri="{FF2B5EF4-FFF2-40B4-BE49-F238E27FC236}">
+                <a16:creationId xmlns:a16="http://schemas.microsoft.com/office/drawing/2014/main" id="{41085CA3-E718-856B-9B4B-22144FB097FB}"/>
+              </a:ext>
+            </a:extLst>
+          </p:cNvPr>
+          <p:cNvPicPr>
+            <a:picLocks/>
+          </p:cNvPicPr>
+          <p:nvPr/>
+        </p:nvPicPr>
+        <p:blipFill>
+          <a:blip r:embed="rId3"/>
+          <a:srcRect l="546" t="205" r="192" b="193"/>
+          <a:stretch>
+            <a:fillRect/>
+          </a:stretch>
+        </p:blipFill>
+        <p:spPr>
+          <a:xfrm>
+            <a:off x="689632" y="347254"/>
+            <a:ext cx="7608679" cy="4325171"/>
+          </a:xfrm>
+          <a:prstGeom prst="rect">
+            <a:avLst/>
+          </a:prstGeom>
+        </p:spPr>
+      </p:pic>
+    </p:spTree>
+    <p:extLst>
+      <p:ext uri="{BB962C8B-B14F-4D97-AF65-F5344CB8AC3E}">
+        <p14:creationId xmlns:p14="http://schemas.microsoft.com/office/powerpoint/2010/main" val="1501121212"/>
+      </p:ext>
+    </p:extLst>
+  </p:cSld>
+  <p:clrMapOvr>
+    <a:masterClrMapping/>
+  </p:clrMapOvr>
+  <mc:AlternateContent xmlns:mc="http://schemas.openxmlformats.org/markup-compatibility/2006" xmlns:p159="http://schemas.microsoft.com/office/powerpoint/2015/09/main">
+    <mc:Choice Requires="p159">
+      <p:transition xmlns:p14="http://schemas.microsoft.com/office/powerpoint/2010/main" spd="slow" p14:dur="2000">
+        <p159:morph option="byObject"/>
+      </p:transition>
+    </mc:Choice>
+    <mc:Fallback xmlns="">
+      <p:transition spd="slow">
+        <p:fade/>
+      </p:transition>
+    </mc:Fallback>
+  </mc:AlternateContent>
+</p:sld>
+</file>
+
+<file path=ppt/slides/slide35.xml><?xml version="1.0" encoding="utf-8"?>
+<p:sld xmlns:a="http://schemas.openxmlformats.org/drawingml/2006/main" xmlns:r="http://schemas.openxmlformats.org/officeDocument/2006/relationships" xmlns:p="http://schemas.openxmlformats.org/presentationml/2006/main">
+  <p:cSld>
+    <p:spTree>
+      <p:nvGrpSpPr>
+        <p:cNvPr id="1" name=""/>
+        <p:cNvGrpSpPr/>
+        <p:nvPr/>
+      </p:nvGrpSpPr>
+      <p:grpSpPr>
+        <a:xfrm>
+          <a:off x="0" y="0"/>
+          <a:ext cx="0" cy="0"/>
+          <a:chOff x="0" y="0"/>
+          <a:chExt cx="0" cy="0"/>
+        </a:xfrm>
+      </p:grpSpPr>
+      <p:pic>
+        <p:nvPicPr>
+          <p:cNvPr id="6" name="Picture 5">
+            <a:extLst>
+              <a:ext uri="{FF2B5EF4-FFF2-40B4-BE49-F238E27FC236}">
+                <a16:creationId xmlns:a16="http://schemas.microsoft.com/office/drawing/2014/main" id="{0A7E9B1E-D292-CAF0-1B8E-E16B931D7F68}"/>
+              </a:ext>
+            </a:extLst>
+          </p:cNvPr>
+          <p:cNvPicPr>
+            <a:picLocks/>
+          </p:cNvPicPr>
+          <p:nvPr/>
+        </p:nvPicPr>
+        <p:blipFill>
+          <a:blip r:embed="rId2"/>
+          <a:srcRect l="595" t="-12" r="1790" b="1783"/>
+          <a:stretch>
+            <a:fillRect/>
+          </a:stretch>
+        </p:blipFill>
+        <p:spPr>
+          <a:xfrm>
+            <a:off x="1487753" y="110766"/>
+            <a:ext cx="5954301" cy="4921967"/>
+          </a:xfrm>
+          <a:prstGeom prst="rect">
+            <a:avLst/>
+          </a:prstGeom>
+        </p:spPr>
+      </p:pic>
+    </p:spTree>
+    <p:extLst>
+      <p:ext uri="{BB962C8B-B14F-4D97-AF65-F5344CB8AC3E}">
+        <p14:creationId xmlns:p14="http://schemas.microsoft.com/office/powerpoint/2010/main" val="181666432"/>
+      </p:ext>
+    </p:extLst>
+  </p:cSld>
+  <p:clrMapOvr>
+    <a:masterClrMapping/>
+  </p:clrMapOvr>
+  <mc:AlternateContent xmlns:mc="http://schemas.openxmlformats.org/markup-compatibility/2006" xmlns:p159="http://schemas.microsoft.com/office/powerpoint/2015/09/main">
+    <mc:Choice Requires="p159">
+      <p:transition xmlns:p14="http://schemas.microsoft.com/office/powerpoint/2010/main" spd="slow" p14:dur="2000">
+        <p159:morph option="byObject"/>
+      </p:transition>
+    </mc:Choice>
+    <mc:Fallback xmlns="">
+      <p:transition spd="slow">
+        <p:fade/>
+      </p:transition>
+    </mc:Fallback>
+  </mc:AlternateContent>
+</p:sld>
+</file>
+
 <file path=ppt/slides/slide4.xml><?xml version="1.0" encoding="utf-8"?>
 <p:sld xmlns:a="http://schemas.openxmlformats.org/drawingml/2006/main" xmlns:r="http://schemas.openxmlformats.org/officeDocument/2006/relationships" xmlns:p="http://schemas.openxmlformats.org/presentationml/2006/main">
   <p:cSld>

</xml_diff>

<commit_message>
Diagram the theme of qemu-to-gem5
along with need for MC/Ualink arch to enable coupling the systemC component into gem5 arch
</commit_message>
<xml_diff>
--- a/Presentation/UALink deck.pptx
+++ b/Presentation/UALink deck.pptx
@@ -5,7 +5,7 @@
     <p:sldMasterId id="2147483648" r:id="rId1"/>
   </p:sldMasterIdLst>
   <p:notesMasterIdLst>
-    <p:notesMasterId r:id="rId40"/>
+    <p:notesMasterId r:id="rId41"/>
   </p:notesMasterIdLst>
   <p:sldIdLst>
     <p:sldId id="256" r:id="rId2"/>
@@ -46,6 +46,7 @@
     <p:sldId id="291" r:id="rId37"/>
     <p:sldId id="292" r:id="rId38"/>
     <p:sldId id="293" r:id="rId39"/>
+    <p:sldId id="295" r:id="rId40"/>
   </p:sldIdLst>
   <p:sldSz cx="9144000" cy="5143500" type="screen16x9"/>
   <p:notesSz cx="6858000" cy="9144000"/>
@@ -325,6 +326,7 @@
             <p14:sldId id="291"/>
             <p14:sldId id="292"/>
             <p14:sldId id="293"/>
+            <p14:sldId id="295"/>
           </p14:sldIdLst>
         </p14:section>
       </p14:sectionLst>
@@ -344,7 +346,7 @@
       </p15:sldGuideLst>
     </p:ext>
     <p:ext uri="GoogleSlidesCustomDataVersion2">
-      <go:slidesCustomData xmlns:go="http://customooxmlschemas.google.com/" xmlns:ahyp="http://schemas.microsoft.com/office/drawing/2018/hyperlinkcolor" xmlns:p15="http://schemas.microsoft.com/office/powerpoint/2012/main" xmlns:p14="http://schemas.microsoft.com/office/powerpoint/2010/main" xmlns:com="http://schemas.openxmlformats.org/drawingml/2006/compatibility" xmlns:pvml="urn:schemas-microsoft-com:office:powerpoint" xmlns:v="urn:schemas-microsoft-com:vml" xmlns:o="urn:schemas-microsoft-com:office:office" xmlns:dgm="http://schemas.openxmlformats.org/drawingml/2006/diagram" xmlns:c="http://schemas.openxmlformats.org/drawingml/2006/chart" xmlns:mv="urn:schemas-microsoft-com:mac:vml" xmlns:mc="http://schemas.openxmlformats.org/markup-compatibility/2006" xmlns="" r:id="rId41" roundtripDataSignature="AMtx7mjrny4whoIwxBF1efXB5M6HovKoRA=="/>
+      <go:slidesCustomData xmlns="" xmlns:mc="http://schemas.openxmlformats.org/markup-compatibility/2006" xmlns:mv="urn:schemas-microsoft-com:mac:vml" xmlns:c="http://schemas.openxmlformats.org/drawingml/2006/chart" xmlns:dgm="http://schemas.openxmlformats.org/drawingml/2006/diagram" xmlns:o="urn:schemas-microsoft-com:office:office" xmlns:v="urn:schemas-microsoft-com:vml" xmlns:pvml="urn:schemas-microsoft-com:office:powerpoint" xmlns:com="http://schemas.openxmlformats.org/drawingml/2006/compatibility" xmlns:p14="http://schemas.microsoft.com/office/powerpoint/2010/main" xmlns:p15="http://schemas.microsoft.com/office/powerpoint/2012/main" xmlns:ahyp="http://schemas.microsoft.com/office/drawing/2018/hyperlinkcolor" xmlns:go="http://customooxmlschemas.google.com/" r:id="rId42" roundtripDataSignature="AMtx7mjrny4whoIwxBF1efXB5M6HovKoRA=="/>
     </p:ext>
   </p:extLst>
 </p:presentation>
@@ -4621,6 +4623,83 @@
     <p:extLst>
       <p:ext uri="{BB962C8B-B14F-4D97-AF65-F5344CB8AC3E}">
         <p14:creationId xmlns:p14="http://schemas.microsoft.com/office/powerpoint/2010/main" val="3594179576"/>
+      </p:ext>
+    </p:extLst>
+  </p:cSld>
+  <p:clrMapOvr>
+    <a:masterClrMapping/>
+  </p:clrMapOvr>
+</p:notes>
+</file>
+
+<file path=ppt/notesSlides/notesSlide35.xml><?xml version="1.0" encoding="utf-8"?>
+<p:notes xmlns:a="http://schemas.openxmlformats.org/drawingml/2006/main" xmlns:r="http://schemas.openxmlformats.org/officeDocument/2006/relationships" xmlns:p="http://schemas.openxmlformats.org/presentationml/2006/main">
+  <p:cSld>
+    <p:spTree>
+      <p:nvGrpSpPr>
+        <p:cNvPr id="1" name=""/>
+        <p:cNvGrpSpPr/>
+        <p:nvPr/>
+      </p:nvGrpSpPr>
+      <p:grpSpPr>
+        <a:xfrm>
+          <a:off x="0" y="0"/>
+          <a:ext cx="0" cy="0"/>
+          <a:chOff x="0" y="0"/>
+          <a:chExt cx="0" cy="0"/>
+        </a:xfrm>
+      </p:grpSpPr>
+      <p:sp>
+        <p:nvSpPr>
+          <p:cNvPr id="2" name="Slide Image Placeholder 1"/>
+          <p:cNvSpPr>
+            <a:spLocks noGrp="1" noRot="1" noChangeAspect="1"/>
+          </p:cNvSpPr>
+          <p:nvPr>
+            <p:ph type="sldImg"/>
+          </p:nvPr>
+        </p:nvSpPr>
+        <p:spPr>
+          <a:xfrm>
+            <a:off x="381000" y="685800"/>
+            <a:ext cx="6096000" cy="3429000"/>
+          </a:xfrm>
+        </p:spPr>
+      </p:sp>
+      <p:sp>
+        <p:nvSpPr>
+          <p:cNvPr id="3" name="Notes Placeholder 2"/>
+          <p:cNvSpPr>
+            <a:spLocks noGrp="1"/>
+          </p:cNvSpPr>
+          <p:nvPr>
+            <p:ph type="body" idx="1"/>
+          </p:nvPr>
+        </p:nvSpPr>
+        <p:spPr/>
+        <p:txBody>
+          <a:bodyPr/>
+          <a:lstStyle/>
+          <a:p>
+            <a:r>
+              <a:rPr lang="en-US" dirty="0"/>
+              <a:t>https://</a:t>
+            </a:r>
+            <a:r>
+              <a:rPr lang="en-US" dirty="0" err="1"/>
+              <a:t>akolli.github.io</a:t>
+            </a:r>
+            <a:r>
+              <a:rPr lang="en-US" dirty="0"/>
+              <a:t>/pubs/gem5-ispass14.pdf	</a:t>
+            </a:r>
+          </a:p>
+        </p:txBody>
+      </p:sp>
+    </p:spTree>
+    <p:extLst>
+      <p:ext uri="{BB962C8B-B14F-4D97-AF65-F5344CB8AC3E}">
+        <p14:creationId xmlns:p14="http://schemas.microsoft.com/office/powerpoint/2010/main" val="2440306388"/>
       </p:ext>
     </p:extLst>
   </p:cSld>
@@ -32207,6 +32286,272 @@
 </p:sld>
 </file>
 
+<file path=ppt/slides/slide39.xml><?xml version="1.0" encoding="utf-8"?>
+<p:sld xmlns:a="http://schemas.openxmlformats.org/drawingml/2006/main" xmlns:r="http://schemas.openxmlformats.org/officeDocument/2006/relationships" xmlns:p="http://schemas.openxmlformats.org/presentationml/2006/main">
+  <p:cSld>
+    <p:spTree>
+      <p:nvGrpSpPr>
+        <p:cNvPr id="1" name=""/>
+        <p:cNvGrpSpPr/>
+        <p:nvPr/>
+      </p:nvGrpSpPr>
+      <p:grpSpPr>
+        <a:xfrm>
+          <a:off x="0" y="0"/>
+          <a:ext cx="0" cy="0"/>
+          <a:chOff x="0" y="0"/>
+          <a:chExt cx="0" cy="0"/>
+        </a:xfrm>
+      </p:grpSpPr>
+      <p:sp>
+        <p:nvSpPr>
+          <p:cNvPr id="2" name="Title 1">
+            <a:extLst>
+              <a:ext uri="{FF2B5EF4-FFF2-40B4-BE49-F238E27FC236}">
+                <a16:creationId xmlns:a16="http://schemas.microsoft.com/office/drawing/2014/main" id="{07A9E4E6-F255-BA5E-A6E8-BFE0481FDB18}"/>
+              </a:ext>
+            </a:extLst>
+          </p:cNvPr>
+          <p:cNvSpPr>
+            <a:spLocks noGrp="1"/>
+          </p:cNvSpPr>
+          <p:nvPr>
+            <p:ph type="title"/>
+          </p:nvPr>
+        </p:nvSpPr>
+        <p:spPr/>
+        <p:txBody>
+          <a:bodyPr>
+            <a:normAutofit fontScale="90000"/>
+          </a:bodyPr>
+          <a:lstStyle/>
+          <a:p>
+            <a:r>
+              <a:rPr lang="en-US" dirty="0"/>
+              <a:t>Gem5’n the mess</a:t>
+            </a:r>
+          </a:p>
+        </p:txBody>
+      </p:sp>
+      <p:sp>
+        <p:nvSpPr>
+          <p:cNvPr id="3" name="Text Placeholder 2">
+            <a:extLst>
+              <a:ext uri="{FF2B5EF4-FFF2-40B4-BE49-F238E27FC236}">
+                <a16:creationId xmlns:a16="http://schemas.microsoft.com/office/drawing/2014/main" id="{78267AD1-6801-35AC-1D0B-EDC8A4822CC7}"/>
+              </a:ext>
+            </a:extLst>
+          </p:cNvPr>
+          <p:cNvSpPr>
+            <a:spLocks noGrp="1"/>
+          </p:cNvSpPr>
+          <p:nvPr>
+            <p:ph type="body" idx="1"/>
+          </p:nvPr>
+        </p:nvSpPr>
+        <p:spPr/>
+        <p:txBody>
+          <a:bodyPr/>
+          <a:lstStyle/>
+          <a:p>
+            <a:r>
+              <a:rPr lang="en-US" dirty="0" err="1"/>
+              <a:t>Vermulator</a:t>
+            </a:r>
+            <a:r>
+              <a:rPr lang="en-US" dirty="0"/>
+              <a:t> of </a:t>
+            </a:r>
+            <a:r>
+              <a:rPr lang="en-US" dirty="0" err="1"/>
+              <a:t>PortAlchemy’s</a:t>
+            </a:r>
+            <a:r>
+              <a:rPr lang="en-US" dirty="0"/>
+              <a:t> FPGA</a:t>
+            </a:r>
+          </a:p>
+          <a:p>
+            <a:r>
+              <a:rPr lang="en-US" dirty="0"/>
+              <a:t>Settle on Arch of </a:t>
+            </a:r>
+            <a:r>
+              <a:rPr lang="en-US" dirty="0" err="1"/>
+              <a:t>Ualink</a:t>
+            </a:r>
+            <a:r>
+              <a:rPr lang="en-US" dirty="0"/>
+              <a:t> MC</a:t>
+            </a:r>
+            <a:br>
+              <a:rPr lang="en-US" dirty="0"/>
+            </a:br>
+            <a:r>
+              <a:rPr lang="en-US" dirty="0"/>
+              <a:t>	(see :mc Dram controller </a:t>
+            </a:r>
+            <a:r>
+              <a:rPr lang="en-US" dirty="0" err="1"/>
+              <a:t>diag</a:t>
+            </a:r>
+            <a:r>
+              <a:rPr lang="en-US" dirty="0"/>
+              <a:t>)</a:t>
+            </a:r>
+          </a:p>
+          <a:p>
+            <a:pPr lvl="1"/>
+            <a:r>
+              <a:rPr lang="en-US" dirty="0"/>
+              <a:t>Couple/adjust the MC &amp;/or </a:t>
+            </a:r>
+            <a:r>
+              <a:rPr lang="en-US" dirty="0" err="1"/>
+              <a:t>Dramctl</a:t>
+            </a:r>
+            <a:r>
+              <a:rPr lang="en-US" dirty="0"/>
+              <a:t> to be compatible</a:t>
+            </a:r>
+          </a:p>
+          <a:p>
+            <a:pPr lvl="1"/>
+            <a:r>
+              <a:rPr lang="en-US" dirty="0"/>
+              <a:t>Adjust for the “</a:t>
+            </a:r>
+            <a:r>
+              <a:rPr lang="en-US" dirty="0" err="1"/>
+              <a:t>alloc</a:t>
+            </a:r>
+            <a:r>
+              <a:rPr lang="en-US" dirty="0"/>
+              <a:t>”/”free” interface for backing memory with the FPGA mem</a:t>
+            </a:r>
+          </a:p>
+          <a:p>
+            <a:pPr lvl="1"/>
+            <a:r>
+              <a:rPr lang="en-US" dirty="0"/>
+              <a:t>(see notes)</a:t>
+            </a:r>
+          </a:p>
+          <a:p>
+            <a:r>
+              <a:rPr lang="en-US" dirty="0"/>
+              <a:t>Analyze by</a:t>
+            </a:r>
+          </a:p>
+          <a:p>
+            <a:pPr lvl="1"/>
+            <a:r>
+              <a:rPr lang="en-US" dirty="0"/>
+              <a:t>Run in </a:t>
+            </a:r>
+            <a:r>
+              <a:rPr lang="en-US" dirty="0" err="1"/>
+              <a:t>Qemu</a:t>
+            </a:r>
+            <a:endParaRPr lang="en-US" dirty="0"/>
+          </a:p>
+          <a:p>
+            <a:pPr lvl="1"/>
+            <a:r>
+              <a:rPr lang="en-US" dirty="0"/>
+              <a:t>get checkpoint</a:t>
+            </a:r>
+          </a:p>
+          <a:p>
+            <a:pPr lvl="1"/>
+            <a:r>
+              <a:rPr lang="en-US" dirty="0"/>
+              <a:t>transfer to gem</a:t>
+            </a:r>
+          </a:p>
+          <a:p>
+            <a:pPr lvl="1"/>
+            <a:r>
+              <a:rPr lang="en-US"/>
+              <a:t>simulate</a:t>
+            </a:r>
+            <a:endParaRPr lang="en-US" dirty="0"/>
+          </a:p>
+        </p:txBody>
+      </p:sp>
+      <p:pic>
+        <p:nvPicPr>
+          <p:cNvPr id="5" name="Picture 4">
+            <a:extLst>
+              <a:ext uri="{FF2B5EF4-FFF2-40B4-BE49-F238E27FC236}">
+                <a16:creationId xmlns:a16="http://schemas.microsoft.com/office/drawing/2014/main" id="{269D3E13-2C1B-4175-C3AC-CFEFB7EFA943}"/>
+              </a:ext>
+            </a:extLst>
+          </p:cNvPr>
+          <p:cNvPicPr>
+            <a:picLocks noChangeAspect="1"/>
+          </p:cNvPicPr>
+          <p:nvPr/>
+        </p:nvPicPr>
+        <p:blipFill>
+          <a:blip r:embed="rId3"/>
+          <a:stretch>
+            <a:fillRect/>
+          </a:stretch>
+        </p:blipFill>
+        <p:spPr>
+          <a:xfrm>
+            <a:off x="4474630" y="731375"/>
+            <a:ext cx="4312486" cy="1860807"/>
+          </a:xfrm>
+          <a:prstGeom prst="rect">
+            <a:avLst/>
+          </a:prstGeom>
+        </p:spPr>
+      </p:pic>
+      <p:pic>
+        <p:nvPicPr>
+          <p:cNvPr id="6" name="Picture 5">
+            <a:extLst>
+              <a:ext uri="{FF2B5EF4-FFF2-40B4-BE49-F238E27FC236}">
+                <a16:creationId xmlns:a16="http://schemas.microsoft.com/office/drawing/2014/main" id="{3325C9D7-021E-F345-8687-424E34FF4075}"/>
+              </a:ext>
+            </a:extLst>
+          </p:cNvPr>
+          <p:cNvPicPr>
+            <a:picLocks noChangeAspect="1"/>
+          </p:cNvPicPr>
+          <p:nvPr/>
+        </p:nvPicPr>
+        <p:blipFill>
+          <a:blip r:embed="rId4"/>
+          <a:stretch>
+            <a:fillRect/>
+          </a:stretch>
+        </p:blipFill>
+        <p:spPr>
+          <a:xfrm>
+            <a:off x="4301928" y="2895857"/>
+            <a:ext cx="4657890" cy="1516268"/>
+          </a:xfrm>
+          <a:prstGeom prst="rect">
+            <a:avLst/>
+          </a:prstGeom>
+        </p:spPr>
+      </p:pic>
+    </p:spTree>
+    <p:extLst>
+      <p:ext uri="{BB962C8B-B14F-4D97-AF65-F5344CB8AC3E}">
+        <p14:creationId xmlns:p14="http://schemas.microsoft.com/office/powerpoint/2010/main" val="926423432"/>
+      </p:ext>
+    </p:extLst>
+  </p:cSld>
+  <p:clrMapOvr>
+    <a:masterClrMapping/>
+  </p:clrMapOvr>
+</p:sld>
+</file>
+
 <file path=ppt/slides/slide4.xml><?xml version="1.0" encoding="utf-8"?>
 <p:sld xmlns:a="http://schemas.openxmlformats.org/drawingml/2006/main" xmlns:r="http://schemas.openxmlformats.org/officeDocument/2006/relationships" xmlns:p="http://schemas.openxmlformats.org/presentationml/2006/main">
   <p:cSld>

</xml_diff>